<commit_message>
Site updated: 2019-04-11 23:22:21
</commit_message>
<xml_diff>
--- a/原型继承.pptx
+++ b/原型继承.pptx
@@ -200,7 +200,7 @@
           <a:p>
             <a:fld id="{A6626B6A-5A95-4082-871D-BE81B8A534EC}" type="datetimeFigureOut">
               <a:rPr lang="zh-CN" altLang="en-US" smtClean="0"/>
-              <a:t>2017/12/21</a:t>
+              <a:t>2018/3/4</a:t>
             </a:fld>
             <a:endParaRPr lang="zh-CN" altLang="en-US"/>
           </a:p>
@@ -733,7 +733,7 @@
           <a:p>
             <a:fld id="{F972ADE4-A944-48A0-9378-57A64A6FB14D}" type="datetimeFigureOut">
               <a:rPr lang="zh-CN" altLang="en-US" smtClean="0"/>
-              <a:t>2017/12/21</a:t>
+              <a:t>2018/3/4</a:t>
             </a:fld>
             <a:endParaRPr lang="zh-CN" altLang="en-US"/>
           </a:p>
@@ -903,7 +903,7 @@
           <a:p>
             <a:fld id="{F972ADE4-A944-48A0-9378-57A64A6FB14D}" type="datetimeFigureOut">
               <a:rPr lang="zh-CN" altLang="en-US" smtClean="0"/>
-              <a:t>2017/12/21</a:t>
+              <a:t>2018/3/4</a:t>
             </a:fld>
             <a:endParaRPr lang="zh-CN" altLang="en-US"/>
           </a:p>
@@ -1083,7 +1083,7 @@
           <a:p>
             <a:fld id="{F972ADE4-A944-48A0-9378-57A64A6FB14D}" type="datetimeFigureOut">
               <a:rPr lang="zh-CN" altLang="en-US" smtClean="0"/>
-              <a:t>2017/12/21</a:t>
+              <a:t>2018/3/4</a:t>
             </a:fld>
             <a:endParaRPr lang="zh-CN" altLang="en-US"/>
           </a:p>
@@ -1253,7 +1253,7 @@
           <a:p>
             <a:fld id="{F972ADE4-A944-48A0-9378-57A64A6FB14D}" type="datetimeFigureOut">
               <a:rPr lang="zh-CN" altLang="en-US" smtClean="0"/>
-              <a:t>2017/12/21</a:t>
+              <a:t>2018/3/4</a:t>
             </a:fld>
             <a:endParaRPr lang="zh-CN" altLang="en-US"/>
           </a:p>
@@ -1499,7 +1499,7 @@
           <a:p>
             <a:fld id="{F972ADE4-A944-48A0-9378-57A64A6FB14D}" type="datetimeFigureOut">
               <a:rPr lang="zh-CN" altLang="en-US" smtClean="0"/>
-              <a:t>2017/12/21</a:t>
+              <a:t>2018/3/4</a:t>
             </a:fld>
             <a:endParaRPr lang="zh-CN" altLang="en-US"/>
           </a:p>
@@ -1787,7 +1787,7 @@
           <a:p>
             <a:fld id="{F972ADE4-A944-48A0-9378-57A64A6FB14D}" type="datetimeFigureOut">
               <a:rPr lang="zh-CN" altLang="en-US" smtClean="0"/>
-              <a:t>2017/12/21</a:t>
+              <a:t>2018/3/4</a:t>
             </a:fld>
             <a:endParaRPr lang="zh-CN" altLang="en-US"/>
           </a:p>
@@ -2209,7 +2209,7 @@
           <a:p>
             <a:fld id="{F972ADE4-A944-48A0-9378-57A64A6FB14D}" type="datetimeFigureOut">
               <a:rPr lang="zh-CN" altLang="en-US" smtClean="0"/>
-              <a:t>2017/12/21</a:t>
+              <a:t>2018/3/4</a:t>
             </a:fld>
             <a:endParaRPr lang="zh-CN" altLang="en-US"/>
           </a:p>
@@ -2327,7 +2327,7 @@
           <a:p>
             <a:fld id="{F972ADE4-A944-48A0-9378-57A64A6FB14D}" type="datetimeFigureOut">
               <a:rPr lang="zh-CN" altLang="en-US" smtClean="0"/>
-              <a:t>2017/12/21</a:t>
+              <a:t>2018/3/4</a:t>
             </a:fld>
             <a:endParaRPr lang="zh-CN" altLang="en-US"/>
           </a:p>
@@ -2422,7 +2422,7 @@
           <a:p>
             <a:fld id="{F972ADE4-A944-48A0-9378-57A64A6FB14D}" type="datetimeFigureOut">
               <a:rPr lang="zh-CN" altLang="en-US" smtClean="0"/>
-              <a:t>2017/12/21</a:t>
+              <a:t>2018/3/4</a:t>
             </a:fld>
             <a:endParaRPr lang="zh-CN" altLang="en-US"/>
           </a:p>
@@ -2699,7 +2699,7 @@
           <a:p>
             <a:fld id="{F972ADE4-A944-48A0-9378-57A64A6FB14D}" type="datetimeFigureOut">
               <a:rPr lang="zh-CN" altLang="en-US" smtClean="0"/>
-              <a:t>2017/12/21</a:t>
+              <a:t>2018/3/4</a:t>
             </a:fld>
             <a:endParaRPr lang="zh-CN" altLang="en-US"/>
           </a:p>
@@ -2952,7 +2952,7 @@
           <a:p>
             <a:fld id="{F972ADE4-A944-48A0-9378-57A64A6FB14D}" type="datetimeFigureOut">
               <a:rPr lang="zh-CN" altLang="en-US" smtClean="0"/>
-              <a:t>2017/12/21</a:t>
+              <a:t>2018/3/4</a:t>
             </a:fld>
             <a:endParaRPr lang="zh-CN" altLang="en-US"/>
           </a:p>
@@ -3165,7 +3165,7 @@
           <a:p>
             <a:fld id="{F972ADE4-A944-48A0-9378-57A64A6FB14D}" type="datetimeFigureOut">
               <a:rPr lang="zh-CN" altLang="en-US" smtClean="0"/>
-              <a:t>2017/12/21</a:t>
+              <a:t>2018/3/4</a:t>
             </a:fld>
             <a:endParaRPr lang="zh-CN" altLang="en-US"/>
           </a:p>
@@ -5292,7 +5292,7 @@
         </p:nvSpPr>
         <p:spPr>
           <a:xfrm>
-            <a:off x="7020272" y="783556"/>
+            <a:off x="6372200" y="332656"/>
             <a:ext cx="2664296" cy="646331"/>
           </a:xfrm>
           <a:prstGeom prst="rect">
@@ -13993,1520 +13993,1454 @@
       </p:sp>
       <p:grpSp>
         <p:nvGrpSpPr>
-          <p:cNvPr id="60" name="组合 59"/>
+          <p:cNvPr id="5" name="组合 4"/>
           <p:cNvGrpSpPr/>
           <p:nvPr/>
         </p:nvGrpSpPr>
         <p:grpSpPr>
           <a:xfrm>
-            <a:off x="611561" y="4509120"/>
-            <a:ext cx="2592000" cy="949660"/>
-            <a:chOff x="476216" y="1385036"/>
-            <a:chExt cx="2592000" cy="949660"/>
+            <a:off x="611560" y="1052736"/>
+            <a:ext cx="6859663" cy="5630180"/>
+            <a:chOff x="611560" y="1052736"/>
+            <a:chExt cx="6859663" cy="5630180"/>
           </a:xfrm>
         </p:grpSpPr>
-        <p:sp>
-          <p:nvSpPr>
-            <p:cNvPr id="98" name="矩形 97"/>
-            <p:cNvSpPr/>
+        <p:grpSp>
+          <p:nvGrpSpPr>
+            <p:cNvPr id="60" name="组合 59"/>
+            <p:cNvGrpSpPr/>
             <p:nvPr/>
-          </p:nvSpPr>
+          </p:nvGrpSpPr>
+          <p:grpSpPr>
+            <a:xfrm>
+              <a:off x="611561" y="4509120"/>
+              <a:ext cx="2592000" cy="949660"/>
+              <a:chOff x="476216" y="1385036"/>
+              <a:chExt cx="2592000" cy="949660"/>
+            </a:xfrm>
+          </p:grpSpPr>
+          <p:sp>
+            <p:nvSpPr>
+              <p:cNvPr id="98" name="矩形 97"/>
+              <p:cNvSpPr/>
+              <p:nvPr/>
+            </p:nvSpPr>
+            <p:spPr>
+              <a:xfrm>
+                <a:off x="476216" y="1391312"/>
+                <a:ext cx="2592000" cy="942908"/>
+              </a:xfrm>
+              <a:prstGeom prst="rect">
+                <a:avLst/>
+              </a:prstGeom>
+              <a:solidFill>
+                <a:schemeClr val="bg1">
+                  <a:lumMod val="95000"/>
+                </a:schemeClr>
+              </a:solidFill>
+              <a:ln w="19050">
+                <a:solidFill>
+                  <a:schemeClr val="tx1"/>
+                </a:solidFill>
+              </a:ln>
+            </p:spPr>
+            <p:style>
+              <a:lnRef idx="2">
+                <a:schemeClr val="accent1">
+                  <a:shade val="50000"/>
+                </a:schemeClr>
+              </a:lnRef>
+              <a:fillRef idx="1">
+                <a:schemeClr val="accent1"/>
+              </a:fillRef>
+              <a:effectRef idx="0">
+                <a:schemeClr val="accent1"/>
+              </a:effectRef>
+              <a:fontRef idx="minor">
+                <a:schemeClr val="lt1"/>
+              </a:fontRef>
+            </p:style>
+            <p:txBody>
+              <a:bodyPr rtlCol="0" anchor="ctr"/>
+              <a:lstStyle/>
+              <a:p>
+                <a:pPr algn="ctr"/>
+                <a:endParaRPr lang="zh-CN" altLang="en-US">
+                  <a:latin typeface="Times New Roman" pitchFamily="18" charset="0"/>
+                  <a:cs typeface="Times New Roman" pitchFamily="18" charset="0"/>
+                </a:endParaRPr>
+              </a:p>
+            </p:txBody>
+          </p:sp>
+          <p:sp>
+            <p:nvSpPr>
+              <p:cNvPr id="99" name="矩形 98"/>
+              <p:cNvSpPr/>
+              <p:nvPr/>
+            </p:nvSpPr>
+            <p:spPr>
+              <a:xfrm>
+                <a:off x="476216" y="1385036"/>
+                <a:ext cx="2592000" cy="315772"/>
+              </a:xfrm>
+              <a:prstGeom prst="rect">
+                <a:avLst/>
+              </a:prstGeom>
+              <a:solidFill>
+                <a:schemeClr val="accent5">
+                  <a:lumMod val="40000"/>
+                  <a:lumOff val="60000"/>
+                </a:schemeClr>
+              </a:solidFill>
+              <a:ln w="19050">
+                <a:solidFill>
+                  <a:schemeClr val="tx1"/>
+                </a:solidFill>
+              </a:ln>
+            </p:spPr>
+            <p:style>
+              <a:lnRef idx="2">
+                <a:schemeClr val="accent1">
+                  <a:shade val="50000"/>
+                </a:schemeClr>
+              </a:lnRef>
+              <a:fillRef idx="1">
+                <a:schemeClr val="accent1"/>
+              </a:fillRef>
+              <a:effectRef idx="0">
+                <a:schemeClr val="accent1"/>
+              </a:effectRef>
+              <a:fontRef idx="minor">
+                <a:schemeClr val="lt1"/>
+              </a:fontRef>
+            </p:style>
+            <p:txBody>
+              <a:bodyPr rtlCol="0" anchor="ctr"/>
+              <a:lstStyle/>
+              <a:p>
+                <a:pPr algn="ctr"/>
+                <a:r>
+                  <a:rPr lang="en-US" altLang="zh-CN" dirty="0" smtClean="0">
+                    <a:solidFill>
+                      <a:schemeClr val="tx1"/>
+                    </a:solidFill>
+                    <a:latin typeface="Times New Roman" pitchFamily="18" charset="0"/>
+                    <a:cs typeface="Times New Roman" pitchFamily="18" charset="0"/>
+                  </a:rPr>
+                  <a:t>Person</a:t>
+                </a:r>
+                <a:endParaRPr lang="zh-CN" altLang="en-US" dirty="0">
+                  <a:solidFill>
+                    <a:schemeClr val="tx1"/>
+                  </a:solidFill>
+                  <a:latin typeface="Times New Roman" pitchFamily="18" charset="0"/>
+                  <a:cs typeface="Times New Roman" pitchFamily="18" charset="0"/>
+                </a:endParaRPr>
+              </a:p>
+            </p:txBody>
+          </p:sp>
+          <p:sp>
+            <p:nvSpPr>
+              <p:cNvPr id="100" name="矩形 99"/>
+              <p:cNvSpPr/>
+              <p:nvPr/>
+            </p:nvSpPr>
+            <p:spPr>
+              <a:xfrm>
+                <a:off x="476359" y="1700808"/>
+                <a:ext cx="1296000" cy="315772"/>
+              </a:xfrm>
+              <a:prstGeom prst="rect">
+                <a:avLst/>
+              </a:prstGeom>
+              <a:solidFill>
+                <a:schemeClr val="bg1">
+                  <a:lumMod val="95000"/>
+                </a:schemeClr>
+              </a:solidFill>
+              <a:ln w="19050">
+                <a:solidFill>
+                  <a:schemeClr val="tx1"/>
+                </a:solidFill>
+              </a:ln>
+            </p:spPr>
+            <p:style>
+              <a:lnRef idx="2">
+                <a:schemeClr val="accent1">
+                  <a:shade val="50000"/>
+                </a:schemeClr>
+              </a:lnRef>
+              <a:fillRef idx="1">
+                <a:schemeClr val="accent1"/>
+              </a:fillRef>
+              <a:effectRef idx="0">
+                <a:schemeClr val="accent1"/>
+              </a:effectRef>
+              <a:fontRef idx="minor">
+                <a:schemeClr val="lt1"/>
+              </a:fontRef>
+            </p:style>
+            <p:txBody>
+              <a:bodyPr rtlCol="0" anchor="ctr"/>
+              <a:lstStyle/>
+              <a:p>
+                <a:pPr algn="ctr"/>
+                <a:r>
+                  <a:rPr lang="en-US" altLang="zh-CN" sz="1600" dirty="0" smtClean="0">
+                    <a:solidFill>
+                      <a:schemeClr val="tx1"/>
+                    </a:solidFill>
+                    <a:latin typeface="Times New Roman" pitchFamily="18" charset="0"/>
+                    <a:cs typeface="Times New Roman" pitchFamily="18" charset="0"/>
+                  </a:rPr>
+                  <a:t>prototype</a:t>
+                </a:r>
+                <a:endParaRPr lang="zh-CN" altLang="en-US" sz="1600" dirty="0">
+                  <a:solidFill>
+                    <a:schemeClr val="tx1"/>
+                  </a:solidFill>
+                  <a:latin typeface="Times New Roman" pitchFamily="18" charset="0"/>
+                  <a:cs typeface="Times New Roman" pitchFamily="18" charset="0"/>
+                </a:endParaRPr>
+              </a:p>
+            </p:txBody>
+          </p:sp>
+          <p:sp>
+            <p:nvSpPr>
+              <p:cNvPr id="101" name="矩形 100"/>
+              <p:cNvSpPr/>
+              <p:nvPr/>
+            </p:nvSpPr>
+            <p:spPr>
+              <a:xfrm>
+                <a:off x="476216" y="2018448"/>
+                <a:ext cx="1296000" cy="315772"/>
+              </a:xfrm>
+              <a:prstGeom prst="rect">
+                <a:avLst/>
+              </a:prstGeom>
+              <a:solidFill>
+                <a:schemeClr val="bg1"/>
+              </a:solidFill>
+              <a:ln w="19050">
+                <a:solidFill>
+                  <a:schemeClr val="tx1"/>
+                </a:solidFill>
+              </a:ln>
+            </p:spPr>
+            <p:style>
+              <a:lnRef idx="2">
+                <a:schemeClr val="accent1">
+                  <a:shade val="50000"/>
+                </a:schemeClr>
+              </a:lnRef>
+              <a:fillRef idx="1">
+                <a:schemeClr val="accent1"/>
+              </a:fillRef>
+              <a:effectRef idx="0">
+                <a:schemeClr val="accent1"/>
+              </a:effectRef>
+              <a:fontRef idx="minor">
+                <a:schemeClr val="lt1"/>
+              </a:fontRef>
+            </p:style>
+            <p:txBody>
+              <a:bodyPr rtlCol="0" anchor="ctr"/>
+              <a:lstStyle/>
+              <a:p>
+                <a:pPr algn="ctr"/>
+                <a:r>
+                  <a:rPr lang="en-US" altLang="zh-CN" sz="1600" dirty="0" smtClean="0">
+                    <a:solidFill>
+                      <a:schemeClr val="tx1"/>
+                    </a:solidFill>
+                    <a:latin typeface="Times New Roman" pitchFamily="18" charset="0"/>
+                    <a:cs typeface="Times New Roman" pitchFamily="18" charset="0"/>
+                  </a:rPr>
+                  <a:t>name</a:t>
+                </a:r>
+                <a:endParaRPr lang="zh-CN" altLang="en-US" sz="1600" dirty="0">
+                  <a:solidFill>
+                    <a:schemeClr val="tx1"/>
+                  </a:solidFill>
+                  <a:latin typeface="Times New Roman" pitchFamily="18" charset="0"/>
+                  <a:cs typeface="Times New Roman" pitchFamily="18" charset="0"/>
+                </a:endParaRPr>
+              </a:p>
+            </p:txBody>
+          </p:sp>
+          <p:sp>
+            <p:nvSpPr>
+              <p:cNvPr id="102" name="矩形 101"/>
+              <p:cNvSpPr/>
+              <p:nvPr/>
+            </p:nvSpPr>
+            <p:spPr>
+              <a:xfrm>
+                <a:off x="1772216" y="2018924"/>
+                <a:ext cx="1296000" cy="315772"/>
+              </a:xfrm>
+              <a:prstGeom prst="rect">
+                <a:avLst/>
+              </a:prstGeom>
+              <a:solidFill>
+                <a:schemeClr val="bg1"/>
+              </a:solidFill>
+              <a:ln w="19050">
+                <a:solidFill>
+                  <a:schemeClr val="tx1"/>
+                </a:solidFill>
+              </a:ln>
+            </p:spPr>
+            <p:style>
+              <a:lnRef idx="2">
+                <a:schemeClr val="accent1">
+                  <a:shade val="50000"/>
+                </a:schemeClr>
+              </a:lnRef>
+              <a:fillRef idx="1">
+                <a:schemeClr val="accent1"/>
+              </a:fillRef>
+              <a:effectRef idx="0">
+                <a:schemeClr val="accent1"/>
+              </a:effectRef>
+              <a:fontRef idx="minor">
+                <a:schemeClr val="lt1"/>
+              </a:fontRef>
+            </p:style>
+            <p:txBody>
+              <a:bodyPr rtlCol="0" anchor="ctr"/>
+              <a:lstStyle/>
+              <a:p>
+                <a:pPr algn="ctr"/>
+                <a:endParaRPr lang="zh-CN" altLang="en-US" sz="1600" dirty="0">
+                  <a:solidFill>
+                    <a:schemeClr val="tx1"/>
+                  </a:solidFill>
+                  <a:latin typeface="Times New Roman" pitchFamily="18" charset="0"/>
+                  <a:cs typeface="Times New Roman" pitchFamily="18" charset="0"/>
+                </a:endParaRPr>
+              </a:p>
+            </p:txBody>
+          </p:sp>
+        </p:grpSp>
+        <p:cxnSp>
+          <p:nvCxnSpPr>
+            <p:cNvPr id="61" name="肘形连接符 60"/>
+            <p:cNvCxnSpPr>
+              <a:endCxn id="58" idx="1"/>
+            </p:cNvCxnSpPr>
+            <p:nvPr/>
+          </p:nvCxnSpPr>
           <p:spPr>
-            <a:xfrm>
-              <a:off x="476216" y="1391312"/>
-              <a:ext cx="2592000" cy="942908"/>
+            <a:xfrm flipV="1">
+              <a:off x="2645499" y="4667006"/>
+              <a:ext cx="1426241" cy="319845"/>
             </a:xfrm>
-            <a:prstGeom prst="rect">
-              <a:avLst/>
+            <a:prstGeom prst="bentConnector3">
+              <a:avLst>
+                <a:gd name="adj1" fmla="val 63356"/>
+              </a:avLst>
             </a:prstGeom>
-            <a:solidFill>
-              <a:schemeClr val="bg1">
-                <a:lumMod val="95000"/>
-              </a:schemeClr>
-            </a:solidFill>
             <a:ln w="19050">
               <a:solidFill>
                 <a:schemeClr val="tx1"/>
               </a:solidFill>
+              <a:headEnd type="oval" w="med" len="med"/>
+              <a:tailEnd type="triangle" w="lg" len="med"/>
             </a:ln>
           </p:spPr>
           <p:style>
-            <a:lnRef idx="2">
-              <a:schemeClr val="accent1">
-                <a:shade val="50000"/>
-              </a:schemeClr>
+            <a:lnRef idx="1">
+              <a:schemeClr val="accent1"/>
             </a:lnRef>
-            <a:fillRef idx="1">
+            <a:fillRef idx="0">
               <a:schemeClr val="accent1"/>
             </a:fillRef>
             <a:effectRef idx="0">
               <a:schemeClr val="accent1"/>
             </a:effectRef>
             <a:fontRef idx="minor">
-              <a:schemeClr val="lt1"/>
+              <a:schemeClr val="tx1"/>
             </a:fontRef>
           </p:style>
-          <p:txBody>
-            <a:bodyPr rtlCol="0" anchor="ctr"/>
-            <a:lstStyle/>
-            <a:p>
-              <a:pPr algn="ctr"/>
-              <a:endParaRPr lang="zh-CN" altLang="en-US">
-                <a:latin typeface="Times New Roman" pitchFamily="18" charset="0"/>
-                <a:cs typeface="Times New Roman" pitchFamily="18" charset="0"/>
-              </a:endParaRPr>
-            </a:p>
-          </p:txBody>
-        </p:sp>
-        <p:sp>
-          <p:nvSpPr>
-            <p:cNvPr id="99" name="矩形 98"/>
-            <p:cNvSpPr/>
+        </p:cxnSp>
+        <p:grpSp>
+          <p:nvGrpSpPr>
+            <p:cNvPr id="64" name="组合 63"/>
+            <p:cNvGrpSpPr/>
             <p:nvPr/>
-          </p:nvSpPr>
+          </p:nvGrpSpPr>
+          <p:grpSpPr>
+            <a:xfrm>
+              <a:off x="611560" y="1052736"/>
+              <a:ext cx="2592000" cy="633652"/>
+              <a:chOff x="1115616" y="1484784"/>
+              <a:chExt cx="2448272" cy="705660"/>
+            </a:xfrm>
+          </p:grpSpPr>
+          <p:sp>
+            <p:nvSpPr>
+              <p:cNvPr id="95" name="矩形 94"/>
+              <p:cNvSpPr/>
+              <p:nvPr/>
+            </p:nvSpPr>
+            <p:spPr>
+              <a:xfrm>
+                <a:off x="1115616" y="1484784"/>
+                <a:ext cx="2448272" cy="705660"/>
+              </a:xfrm>
+              <a:prstGeom prst="rect">
+                <a:avLst/>
+              </a:prstGeom>
+              <a:solidFill>
+                <a:schemeClr val="bg1">
+                  <a:lumMod val="95000"/>
+                </a:schemeClr>
+              </a:solidFill>
+              <a:ln w="19050">
+                <a:solidFill>
+                  <a:schemeClr val="tx1"/>
+                </a:solidFill>
+              </a:ln>
+            </p:spPr>
+            <p:style>
+              <a:lnRef idx="2">
+                <a:schemeClr val="accent1">
+                  <a:shade val="50000"/>
+                </a:schemeClr>
+              </a:lnRef>
+              <a:fillRef idx="1">
+                <a:schemeClr val="accent1"/>
+              </a:fillRef>
+              <a:effectRef idx="0">
+                <a:schemeClr val="accent1"/>
+              </a:effectRef>
+              <a:fontRef idx="minor">
+                <a:schemeClr val="lt1"/>
+              </a:fontRef>
+            </p:style>
+            <p:txBody>
+              <a:bodyPr rtlCol="0" anchor="ctr"/>
+              <a:lstStyle/>
+              <a:p>
+                <a:pPr algn="ctr"/>
+                <a:endParaRPr lang="zh-CN" altLang="en-US">
+                  <a:latin typeface="Times New Roman" pitchFamily="18" charset="0"/>
+                  <a:cs typeface="Times New Roman" pitchFamily="18" charset="0"/>
+                </a:endParaRPr>
+              </a:p>
+            </p:txBody>
+          </p:sp>
+          <p:sp>
+            <p:nvSpPr>
+              <p:cNvPr id="96" name="矩形 95"/>
+              <p:cNvSpPr/>
+              <p:nvPr/>
+            </p:nvSpPr>
+            <p:spPr>
+              <a:xfrm>
+                <a:off x="1115616" y="1484784"/>
+                <a:ext cx="2448272" cy="351656"/>
+              </a:xfrm>
+              <a:prstGeom prst="rect">
+                <a:avLst/>
+              </a:prstGeom>
+              <a:solidFill>
+                <a:schemeClr val="accent5">
+                  <a:lumMod val="40000"/>
+                  <a:lumOff val="60000"/>
+                </a:schemeClr>
+              </a:solidFill>
+              <a:ln w="19050">
+                <a:solidFill>
+                  <a:schemeClr val="tx1"/>
+                </a:solidFill>
+              </a:ln>
+            </p:spPr>
+            <p:style>
+              <a:lnRef idx="2">
+                <a:schemeClr val="accent1">
+                  <a:shade val="50000"/>
+                </a:schemeClr>
+              </a:lnRef>
+              <a:fillRef idx="1">
+                <a:schemeClr val="accent1"/>
+              </a:fillRef>
+              <a:effectRef idx="0">
+                <a:schemeClr val="accent1"/>
+              </a:effectRef>
+              <a:fontRef idx="minor">
+                <a:schemeClr val="lt1"/>
+              </a:fontRef>
+            </p:style>
+            <p:txBody>
+              <a:bodyPr rtlCol="0" anchor="ctr"/>
+              <a:lstStyle/>
+              <a:p>
+                <a:pPr algn="ctr"/>
+                <a:r>
+                  <a:rPr lang="en-US" altLang="zh-CN" dirty="0" smtClean="0">
+                    <a:solidFill>
+                      <a:schemeClr val="tx1"/>
+                    </a:solidFill>
+                    <a:latin typeface="Times New Roman" pitchFamily="18" charset="0"/>
+                    <a:cs typeface="Times New Roman" pitchFamily="18" charset="0"/>
+                  </a:rPr>
+                  <a:t>Object</a:t>
+                </a:r>
+                <a:endParaRPr lang="zh-CN" altLang="en-US" dirty="0">
+                  <a:solidFill>
+                    <a:schemeClr val="tx1"/>
+                  </a:solidFill>
+                  <a:latin typeface="Times New Roman" pitchFamily="18" charset="0"/>
+                  <a:cs typeface="Times New Roman" pitchFamily="18" charset="0"/>
+                </a:endParaRPr>
+              </a:p>
+            </p:txBody>
+          </p:sp>
+          <p:sp>
+            <p:nvSpPr>
+              <p:cNvPr id="97" name="矩形 96"/>
+              <p:cNvSpPr/>
+              <p:nvPr/>
+            </p:nvSpPr>
+            <p:spPr>
+              <a:xfrm>
+                <a:off x="1115616" y="1838788"/>
+                <a:ext cx="1224136" cy="351656"/>
+              </a:xfrm>
+              <a:prstGeom prst="rect">
+                <a:avLst/>
+              </a:prstGeom>
+              <a:solidFill>
+                <a:schemeClr val="bg1">
+                  <a:lumMod val="95000"/>
+                </a:schemeClr>
+              </a:solidFill>
+              <a:ln w="19050">
+                <a:solidFill>
+                  <a:schemeClr val="tx1"/>
+                </a:solidFill>
+              </a:ln>
+            </p:spPr>
+            <p:style>
+              <a:lnRef idx="2">
+                <a:schemeClr val="accent1">
+                  <a:shade val="50000"/>
+                </a:schemeClr>
+              </a:lnRef>
+              <a:fillRef idx="1">
+                <a:schemeClr val="accent1"/>
+              </a:fillRef>
+              <a:effectRef idx="0">
+                <a:schemeClr val="accent1"/>
+              </a:effectRef>
+              <a:fontRef idx="minor">
+                <a:schemeClr val="lt1"/>
+              </a:fontRef>
+            </p:style>
+            <p:txBody>
+              <a:bodyPr rtlCol="0" anchor="ctr"/>
+              <a:lstStyle/>
+              <a:p>
+                <a:pPr algn="ctr"/>
+                <a:r>
+                  <a:rPr lang="en-US" altLang="zh-CN" sz="1600" dirty="0" smtClean="0">
+                    <a:solidFill>
+                      <a:schemeClr val="tx1"/>
+                    </a:solidFill>
+                    <a:latin typeface="Times New Roman" pitchFamily="18" charset="0"/>
+                    <a:cs typeface="Times New Roman" pitchFamily="18" charset="0"/>
+                  </a:rPr>
+                  <a:t>prototype</a:t>
+                </a:r>
+                <a:endParaRPr lang="zh-CN" altLang="en-US" sz="1600" dirty="0">
+                  <a:solidFill>
+                    <a:schemeClr val="tx1"/>
+                  </a:solidFill>
+                  <a:latin typeface="Times New Roman" pitchFamily="18" charset="0"/>
+                  <a:cs typeface="Times New Roman" pitchFamily="18" charset="0"/>
+                </a:endParaRPr>
+              </a:p>
+            </p:txBody>
+          </p:sp>
+        </p:grpSp>
+        <p:cxnSp>
+          <p:nvCxnSpPr>
+            <p:cNvPr id="67" name="肘形连接符 66"/>
+            <p:cNvCxnSpPr/>
+            <p:nvPr/>
+          </p:nvCxnSpPr>
           <p:spPr>
-            <a:xfrm>
-              <a:off x="476216" y="1385036"/>
-              <a:ext cx="2592000" cy="315772"/>
+            <a:xfrm flipV="1">
+              <a:off x="2555562" y="1210622"/>
+              <a:ext cx="1406361" cy="346172"/>
             </a:xfrm>
-            <a:prstGeom prst="rect">
-              <a:avLst/>
+            <a:prstGeom prst="bentConnector3">
+              <a:avLst>
+                <a:gd name="adj1" fmla="val 71131"/>
+              </a:avLst>
             </a:prstGeom>
-            <a:solidFill>
-              <a:schemeClr val="accent5">
-                <a:lumMod val="40000"/>
-                <a:lumOff val="60000"/>
-              </a:schemeClr>
-            </a:solidFill>
             <a:ln w="19050">
               <a:solidFill>
                 <a:schemeClr val="tx1"/>
               </a:solidFill>
+              <a:headEnd type="oval" w="med" len="med"/>
+              <a:tailEnd type="triangle" w="lg" len="med"/>
             </a:ln>
           </p:spPr>
           <p:style>
-            <a:lnRef idx="2">
-              <a:schemeClr val="accent1">
-                <a:shade val="50000"/>
-              </a:schemeClr>
+            <a:lnRef idx="1">
+              <a:schemeClr val="accent1"/>
             </a:lnRef>
-            <a:fillRef idx="1">
+            <a:fillRef idx="0">
               <a:schemeClr val="accent1"/>
             </a:fillRef>
             <a:effectRef idx="0">
               <a:schemeClr val="accent1"/>
             </a:effectRef>
             <a:fontRef idx="minor">
-              <a:schemeClr val="lt1"/>
+              <a:schemeClr val="tx1"/>
             </a:fontRef>
           </p:style>
-          <p:txBody>
-            <a:bodyPr rtlCol="0" anchor="ctr"/>
-            <a:lstStyle/>
-            <a:p>
-              <a:pPr algn="ctr"/>
-              <a:r>
-                <a:rPr lang="en-US" altLang="zh-CN" dirty="0" smtClean="0">
-                  <a:solidFill>
-                    <a:schemeClr val="tx1"/>
-                  </a:solidFill>
-                  <a:latin typeface="Times New Roman" pitchFamily="18" charset="0"/>
-                  <a:cs typeface="Times New Roman" pitchFamily="18" charset="0"/>
-                </a:rPr>
-                <a:t>Person</a:t>
-              </a:r>
-              <a:endParaRPr lang="zh-CN" altLang="en-US" dirty="0">
-                <a:solidFill>
-                  <a:schemeClr val="tx1"/>
-                </a:solidFill>
-                <a:latin typeface="Times New Roman" pitchFamily="18" charset="0"/>
-                <a:cs typeface="Times New Roman" pitchFamily="18" charset="0"/>
-              </a:endParaRPr>
-            </a:p>
-          </p:txBody>
-        </p:sp>
-        <p:sp>
-          <p:nvSpPr>
-            <p:cNvPr id="100" name="矩形 99"/>
-            <p:cNvSpPr/>
+        </p:cxnSp>
+        <p:cxnSp>
+          <p:nvCxnSpPr>
+            <p:cNvPr id="69" name="直接连接符 68"/>
+            <p:cNvCxnSpPr/>
             <p:nvPr/>
-          </p:nvSpPr>
+          </p:nvCxnSpPr>
           <p:spPr>
             <a:xfrm>
-              <a:off x="476359" y="1700808"/>
-              <a:ext cx="1296000" cy="315772"/>
+              <a:off x="3555216" y="2248056"/>
+              <a:ext cx="1" cy="676888"/>
             </a:xfrm>
-            <a:prstGeom prst="rect">
+            <a:prstGeom prst="line">
               <a:avLst/>
             </a:prstGeom>
-            <a:solidFill>
-              <a:schemeClr val="bg1">
-                <a:lumMod val="95000"/>
-              </a:schemeClr>
-            </a:solidFill>
-            <a:ln w="19050">
+            <a:ln w="28575">
               <a:solidFill>
-                <a:schemeClr val="tx1"/>
+                <a:srgbClr val="FF0000"/>
               </a:solidFill>
+              <a:prstDash val="solid"/>
             </a:ln>
           </p:spPr>
           <p:style>
-            <a:lnRef idx="2">
-              <a:schemeClr val="accent1">
-                <a:shade val="50000"/>
-              </a:schemeClr>
+            <a:lnRef idx="1">
+              <a:schemeClr val="accent1"/>
             </a:lnRef>
-            <a:fillRef idx="1">
+            <a:fillRef idx="0">
               <a:schemeClr val="accent1"/>
             </a:fillRef>
             <a:effectRef idx="0">
               <a:schemeClr val="accent1"/>
             </a:effectRef>
             <a:fontRef idx="minor">
-              <a:schemeClr val="lt1"/>
+              <a:schemeClr val="tx1"/>
             </a:fontRef>
           </p:style>
-          <p:txBody>
-            <a:bodyPr rtlCol="0" anchor="ctr"/>
-            <a:lstStyle/>
-            <a:p>
-              <a:pPr algn="ctr"/>
-              <a:r>
-                <a:rPr lang="en-US" altLang="zh-CN" sz="1600" dirty="0" smtClean="0">
-                  <a:solidFill>
-                    <a:schemeClr val="tx1"/>
-                  </a:solidFill>
-                  <a:latin typeface="Times New Roman" pitchFamily="18" charset="0"/>
-                  <a:cs typeface="Times New Roman" pitchFamily="18" charset="0"/>
-                </a:rPr>
-                <a:t>prototype</a:t>
-              </a:r>
-              <a:endParaRPr lang="zh-CN" altLang="en-US" sz="1600" dirty="0">
-                <a:solidFill>
-                  <a:schemeClr val="tx1"/>
-                </a:solidFill>
-                <a:latin typeface="Times New Roman" pitchFamily="18" charset="0"/>
-                <a:cs typeface="Times New Roman" pitchFamily="18" charset="0"/>
-              </a:endParaRPr>
-            </a:p>
-          </p:txBody>
-        </p:sp>
-        <p:sp>
-          <p:nvSpPr>
-            <p:cNvPr id="101" name="矩形 100"/>
-            <p:cNvSpPr/>
+        </p:cxnSp>
+        <p:cxnSp>
+          <p:nvCxnSpPr>
+            <p:cNvPr id="70" name="肘形连接符 69"/>
+            <p:cNvCxnSpPr>
+              <a:endCxn id="88" idx="1"/>
+            </p:cNvCxnSpPr>
             <p:nvPr/>
-          </p:nvSpPr>
+          </p:nvCxnSpPr>
           <p:spPr>
-            <a:xfrm>
-              <a:off x="476216" y="2018448"/>
-              <a:ext cx="1296000" cy="315772"/>
+            <a:xfrm rot="5400000" flipH="1" flipV="1">
+              <a:off x="3296342" y="1470551"/>
+              <a:ext cx="1034272" cy="516523"/>
             </a:xfrm>
-            <a:prstGeom prst="rect">
+            <a:prstGeom prst="bentConnector2">
               <a:avLst/>
             </a:prstGeom>
-            <a:solidFill>
-              <a:schemeClr val="bg1"/>
-            </a:solidFill>
-            <a:ln w="19050">
+            <a:ln w="28575">
               <a:solidFill>
-                <a:schemeClr val="tx1"/>
+                <a:srgbClr val="FF0000"/>
               </a:solidFill>
+              <a:headEnd type="none" w="med" len="med"/>
+              <a:tailEnd type="triangle" w="lg" len="med"/>
             </a:ln>
           </p:spPr>
           <p:style>
-            <a:lnRef idx="2">
-              <a:schemeClr val="accent1">
-                <a:shade val="50000"/>
-              </a:schemeClr>
+            <a:lnRef idx="1">
+              <a:schemeClr val="accent1"/>
             </a:lnRef>
-            <a:fillRef idx="1">
+            <a:fillRef idx="0">
               <a:schemeClr val="accent1"/>
             </a:fillRef>
             <a:effectRef idx="0">
               <a:schemeClr val="accent1"/>
             </a:effectRef>
             <a:fontRef idx="minor">
-              <a:schemeClr val="lt1"/>
+              <a:schemeClr val="tx1"/>
             </a:fontRef>
           </p:style>
-          <p:txBody>
-            <a:bodyPr rtlCol="0" anchor="ctr"/>
-            <a:lstStyle/>
-            <a:p>
-              <a:pPr algn="ctr"/>
-              <a:r>
-                <a:rPr lang="en-US" altLang="zh-CN" sz="1600" dirty="0" smtClean="0">
+        </p:cxnSp>
+        <p:grpSp>
+          <p:nvGrpSpPr>
+            <p:cNvPr id="72" name="组合 71"/>
+            <p:cNvGrpSpPr/>
+            <p:nvPr/>
+          </p:nvGrpSpPr>
+          <p:grpSpPr>
+            <a:xfrm>
+              <a:off x="611560" y="5733256"/>
+              <a:ext cx="2592000" cy="949660"/>
+              <a:chOff x="476216" y="1385036"/>
+              <a:chExt cx="2592000" cy="949660"/>
+            </a:xfrm>
+          </p:grpSpPr>
+          <p:sp>
+            <p:nvSpPr>
+              <p:cNvPr id="90" name="矩形 89"/>
+              <p:cNvSpPr/>
+              <p:nvPr/>
+            </p:nvSpPr>
+            <p:spPr>
+              <a:xfrm>
+                <a:off x="476216" y="1391312"/>
+                <a:ext cx="2592000" cy="942908"/>
+              </a:xfrm>
+              <a:prstGeom prst="rect">
+                <a:avLst/>
+              </a:prstGeom>
+              <a:solidFill>
+                <a:schemeClr val="bg1">
+                  <a:lumMod val="95000"/>
+                </a:schemeClr>
+              </a:solidFill>
+              <a:ln w="19050">
+                <a:solidFill>
+                  <a:schemeClr val="tx1"/>
+                </a:solidFill>
+              </a:ln>
+            </p:spPr>
+            <p:style>
+              <a:lnRef idx="2">
+                <a:schemeClr val="accent1">
+                  <a:shade val="50000"/>
+                </a:schemeClr>
+              </a:lnRef>
+              <a:fillRef idx="1">
+                <a:schemeClr val="accent1"/>
+              </a:fillRef>
+              <a:effectRef idx="0">
+                <a:schemeClr val="accent1"/>
+              </a:effectRef>
+              <a:fontRef idx="minor">
+                <a:schemeClr val="lt1"/>
+              </a:fontRef>
+            </p:style>
+            <p:txBody>
+              <a:bodyPr rtlCol="0" anchor="ctr"/>
+              <a:lstStyle/>
+              <a:p>
+                <a:pPr algn="ctr"/>
+                <a:endParaRPr lang="zh-CN" altLang="en-US">
+                  <a:latin typeface="Times New Roman" pitchFamily="18" charset="0"/>
+                  <a:cs typeface="Times New Roman" pitchFamily="18" charset="0"/>
+                </a:endParaRPr>
+              </a:p>
+            </p:txBody>
+          </p:sp>
+          <p:sp>
+            <p:nvSpPr>
+              <p:cNvPr id="91" name="矩形 90"/>
+              <p:cNvSpPr/>
+              <p:nvPr/>
+            </p:nvSpPr>
+            <p:spPr>
+              <a:xfrm>
+                <a:off x="476216" y="1385036"/>
+                <a:ext cx="2592000" cy="315772"/>
+              </a:xfrm>
+              <a:prstGeom prst="rect">
+                <a:avLst/>
+              </a:prstGeom>
+              <a:solidFill>
+                <a:schemeClr val="accent5">
+                  <a:lumMod val="40000"/>
+                  <a:lumOff val="60000"/>
+                </a:schemeClr>
+              </a:solidFill>
+              <a:ln w="19050">
+                <a:solidFill>
+                  <a:schemeClr val="tx1"/>
+                </a:solidFill>
+              </a:ln>
+            </p:spPr>
+            <p:style>
+              <a:lnRef idx="2">
+                <a:schemeClr val="accent1">
+                  <a:shade val="50000"/>
+                </a:schemeClr>
+              </a:lnRef>
+              <a:fillRef idx="1">
+                <a:schemeClr val="accent1"/>
+              </a:fillRef>
+              <a:effectRef idx="0">
+                <a:schemeClr val="accent1"/>
+              </a:effectRef>
+              <a:fontRef idx="minor">
+                <a:schemeClr val="lt1"/>
+              </a:fontRef>
+            </p:style>
+            <p:txBody>
+              <a:bodyPr rtlCol="0" anchor="ctr"/>
+              <a:lstStyle/>
+              <a:p>
+                <a:pPr algn="ctr"/>
+                <a:r>
+                  <a:rPr lang="en-US" altLang="zh-CN" dirty="0" smtClean="0">
+                    <a:solidFill>
+                      <a:schemeClr val="tx1"/>
+                    </a:solidFill>
+                    <a:latin typeface="Times New Roman" pitchFamily="18" charset="0"/>
+                    <a:cs typeface="Times New Roman" pitchFamily="18" charset="0"/>
+                  </a:rPr>
+                  <a:t>person1</a:t>
+                </a:r>
+                <a:endParaRPr lang="zh-CN" altLang="en-US" dirty="0">
                   <a:solidFill>
                     <a:schemeClr val="tx1"/>
                   </a:solidFill>
                   <a:latin typeface="Times New Roman" pitchFamily="18" charset="0"/>
                   <a:cs typeface="Times New Roman" pitchFamily="18" charset="0"/>
-                </a:rPr>
-                <a:t>name</a:t>
-              </a:r>
-              <a:endParaRPr lang="zh-CN" altLang="en-US" sz="1600" dirty="0">
+                </a:endParaRPr>
+              </a:p>
+            </p:txBody>
+          </p:sp>
+          <p:sp>
+            <p:nvSpPr>
+              <p:cNvPr id="92" name="矩形 91"/>
+              <p:cNvSpPr/>
+              <p:nvPr/>
+            </p:nvSpPr>
+            <p:spPr>
+              <a:xfrm>
+                <a:off x="476216" y="1700808"/>
+                <a:ext cx="1296000" cy="315772"/>
+              </a:xfrm>
+              <a:prstGeom prst="rect">
+                <a:avLst/>
+              </a:prstGeom>
+              <a:solidFill>
+                <a:schemeClr val="bg1">
+                  <a:lumMod val="95000"/>
+                </a:schemeClr>
+              </a:solidFill>
+              <a:ln w="19050">
                 <a:solidFill>
                   <a:schemeClr val="tx1"/>
                 </a:solidFill>
-                <a:latin typeface="Times New Roman" pitchFamily="18" charset="0"/>
-                <a:cs typeface="Times New Roman" pitchFamily="18" charset="0"/>
-              </a:endParaRPr>
-            </a:p>
-          </p:txBody>
-        </p:sp>
-        <p:sp>
-          <p:nvSpPr>
-            <p:cNvPr id="102" name="矩形 101"/>
-            <p:cNvSpPr/>
-            <p:nvPr/>
-          </p:nvSpPr>
-          <p:spPr>
-            <a:xfrm>
-              <a:off x="1772216" y="2018924"/>
-              <a:ext cx="1296000" cy="315772"/>
-            </a:xfrm>
-            <a:prstGeom prst="rect">
-              <a:avLst/>
-            </a:prstGeom>
-            <a:solidFill>
-              <a:schemeClr val="bg1"/>
-            </a:solidFill>
-            <a:ln w="19050">
-              <a:solidFill>
-                <a:schemeClr val="tx1"/>
-              </a:solidFill>
-            </a:ln>
-          </p:spPr>
-          <p:style>
-            <a:lnRef idx="2">
-              <a:schemeClr val="accent1">
-                <a:shade val="50000"/>
-              </a:schemeClr>
-            </a:lnRef>
-            <a:fillRef idx="1">
-              <a:schemeClr val="accent1"/>
-            </a:fillRef>
-            <a:effectRef idx="0">
-              <a:schemeClr val="accent1"/>
-            </a:effectRef>
-            <a:fontRef idx="minor">
-              <a:schemeClr val="lt1"/>
-            </a:fontRef>
-          </p:style>
-          <p:txBody>
-            <a:bodyPr rtlCol="0" anchor="ctr"/>
-            <a:lstStyle/>
-            <a:p>
-              <a:pPr algn="ctr"/>
-              <a:endParaRPr lang="zh-CN" altLang="en-US" sz="1600" dirty="0">
-                <a:solidFill>
-                  <a:schemeClr val="tx1"/>
-                </a:solidFill>
-                <a:latin typeface="Times New Roman" pitchFamily="18" charset="0"/>
-                <a:cs typeface="Times New Roman" pitchFamily="18" charset="0"/>
-              </a:endParaRPr>
-            </a:p>
-          </p:txBody>
-        </p:sp>
-      </p:grpSp>
-      <p:cxnSp>
-        <p:nvCxnSpPr>
-          <p:cNvPr id="61" name="肘形连接符 60"/>
-          <p:cNvCxnSpPr>
-            <a:endCxn id="58" idx="1"/>
-          </p:cNvCxnSpPr>
-          <p:nvPr/>
-        </p:nvCxnSpPr>
-        <p:spPr>
-          <a:xfrm flipV="1">
-            <a:off x="2645499" y="4667006"/>
-            <a:ext cx="1426241" cy="319845"/>
-          </a:xfrm>
-          <a:prstGeom prst="bentConnector3">
-            <a:avLst>
-              <a:gd name="adj1" fmla="val 63356"/>
-            </a:avLst>
-          </a:prstGeom>
-          <a:ln w="19050">
-            <a:solidFill>
-              <a:schemeClr val="tx1"/>
-            </a:solidFill>
-            <a:headEnd type="oval" w="med" len="med"/>
-            <a:tailEnd type="triangle" w="lg" len="med"/>
-          </a:ln>
-        </p:spPr>
-        <p:style>
-          <a:lnRef idx="1">
-            <a:schemeClr val="accent1"/>
-          </a:lnRef>
-          <a:fillRef idx="0">
-            <a:schemeClr val="accent1"/>
-          </a:fillRef>
-          <a:effectRef idx="0">
-            <a:schemeClr val="accent1"/>
-          </a:effectRef>
-          <a:fontRef idx="minor">
-            <a:schemeClr val="tx1"/>
-          </a:fontRef>
-        </p:style>
-      </p:cxnSp>
-      <p:grpSp>
-        <p:nvGrpSpPr>
-          <p:cNvPr id="64" name="组合 63"/>
-          <p:cNvGrpSpPr/>
-          <p:nvPr/>
-        </p:nvGrpSpPr>
-        <p:grpSpPr>
-          <a:xfrm>
-            <a:off x="611560" y="1052736"/>
-            <a:ext cx="2592000" cy="633652"/>
-            <a:chOff x="1115616" y="1484784"/>
-            <a:chExt cx="2448272" cy="705660"/>
-          </a:xfrm>
-        </p:grpSpPr>
-        <p:sp>
-          <p:nvSpPr>
-            <p:cNvPr id="95" name="矩形 94"/>
-            <p:cNvSpPr/>
-            <p:nvPr/>
-          </p:nvSpPr>
-          <p:spPr>
-            <a:xfrm>
-              <a:off x="1115616" y="1484784"/>
-              <a:ext cx="2448272" cy="705660"/>
-            </a:xfrm>
-            <a:prstGeom prst="rect">
-              <a:avLst/>
-            </a:prstGeom>
-            <a:solidFill>
-              <a:schemeClr val="bg1">
-                <a:lumMod val="95000"/>
-              </a:schemeClr>
-            </a:solidFill>
-            <a:ln w="19050">
-              <a:solidFill>
-                <a:schemeClr val="tx1"/>
-              </a:solidFill>
-            </a:ln>
-          </p:spPr>
-          <p:style>
-            <a:lnRef idx="2">
-              <a:schemeClr val="accent1">
-                <a:shade val="50000"/>
-              </a:schemeClr>
-            </a:lnRef>
-            <a:fillRef idx="1">
-              <a:schemeClr val="accent1"/>
-            </a:fillRef>
-            <a:effectRef idx="0">
-              <a:schemeClr val="accent1"/>
-            </a:effectRef>
-            <a:fontRef idx="minor">
-              <a:schemeClr val="lt1"/>
-            </a:fontRef>
-          </p:style>
-          <p:txBody>
-            <a:bodyPr rtlCol="0" anchor="ctr"/>
-            <a:lstStyle/>
-            <a:p>
-              <a:pPr algn="ctr"/>
-              <a:endParaRPr lang="zh-CN" altLang="en-US">
-                <a:latin typeface="Times New Roman" pitchFamily="18" charset="0"/>
-                <a:cs typeface="Times New Roman" pitchFamily="18" charset="0"/>
-              </a:endParaRPr>
-            </a:p>
-          </p:txBody>
-        </p:sp>
-        <p:sp>
-          <p:nvSpPr>
-            <p:cNvPr id="96" name="矩形 95"/>
-            <p:cNvSpPr/>
-            <p:nvPr/>
-          </p:nvSpPr>
-          <p:spPr>
-            <a:xfrm>
-              <a:off x="1115616" y="1484784"/>
-              <a:ext cx="2448272" cy="351656"/>
-            </a:xfrm>
-            <a:prstGeom prst="rect">
-              <a:avLst/>
-            </a:prstGeom>
-            <a:solidFill>
-              <a:schemeClr val="accent5">
-                <a:lumMod val="40000"/>
-                <a:lumOff val="60000"/>
-              </a:schemeClr>
-            </a:solidFill>
-            <a:ln w="19050">
-              <a:solidFill>
-                <a:schemeClr val="tx1"/>
-              </a:solidFill>
-            </a:ln>
-          </p:spPr>
-          <p:style>
-            <a:lnRef idx="2">
-              <a:schemeClr val="accent1">
-                <a:shade val="50000"/>
-              </a:schemeClr>
-            </a:lnRef>
-            <a:fillRef idx="1">
-              <a:schemeClr val="accent1"/>
-            </a:fillRef>
-            <a:effectRef idx="0">
-              <a:schemeClr val="accent1"/>
-            </a:effectRef>
-            <a:fontRef idx="minor">
-              <a:schemeClr val="lt1"/>
-            </a:fontRef>
-          </p:style>
-          <p:txBody>
-            <a:bodyPr rtlCol="0" anchor="ctr"/>
-            <a:lstStyle/>
-            <a:p>
-              <a:pPr algn="ctr"/>
-              <a:r>
-                <a:rPr lang="en-US" altLang="zh-CN" dirty="0" smtClean="0">
+              </a:ln>
+            </p:spPr>
+            <p:style>
+              <a:lnRef idx="2">
+                <a:schemeClr val="accent1">
+                  <a:shade val="50000"/>
+                </a:schemeClr>
+              </a:lnRef>
+              <a:fillRef idx="1">
+                <a:schemeClr val="accent1"/>
+              </a:fillRef>
+              <a:effectRef idx="0">
+                <a:schemeClr val="accent1"/>
+              </a:effectRef>
+              <a:fontRef idx="minor">
+                <a:schemeClr val="lt1"/>
+              </a:fontRef>
+            </p:style>
+            <p:txBody>
+              <a:bodyPr rtlCol="0" anchor="ctr"/>
+              <a:lstStyle/>
+              <a:p>
+                <a:pPr algn="ctr"/>
+                <a:r>
+                  <a:rPr lang="en-US" altLang="zh-CN" sz="1600" dirty="0" smtClean="0">
+                    <a:solidFill>
+                      <a:schemeClr val="tx1"/>
+                    </a:solidFill>
+                    <a:latin typeface="Times New Roman" pitchFamily="18" charset="0"/>
+                    <a:cs typeface="Times New Roman" pitchFamily="18" charset="0"/>
+                  </a:rPr>
+                  <a:t>[[Prototype]]</a:t>
+                </a:r>
+                <a:endParaRPr lang="zh-CN" altLang="en-US" sz="1600" dirty="0">
                   <a:solidFill>
                     <a:schemeClr val="tx1"/>
                   </a:solidFill>
                   <a:latin typeface="Times New Roman" pitchFamily="18" charset="0"/>
                   <a:cs typeface="Times New Roman" pitchFamily="18" charset="0"/>
-                </a:rPr>
-                <a:t>Object</a:t>
-              </a:r>
-              <a:endParaRPr lang="zh-CN" altLang="en-US" dirty="0">
+                </a:endParaRPr>
+              </a:p>
+            </p:txBody>
+          </p:sp>
+          <p:sp>
+            <p:nvSpPr>
+              <p:cNvPr id="93" name="矩形 92"/>
+              <p:cNvSpPr/>
+              <p:nvPr/>
+            </p:nvSpPr>
+            <p:spPr>
+              <a:xfrm>
+                <a:off x="476216" y="2018448"/>
+                <a:ext cx="1296000" cy="315772"/>
+              </a:xfrm>
+              <a:prstGeom prst="rect">
+                <a:avLst/>
+              </a:prstGeom>
+              <a:solidFill>
+                <a:schemeClr val="bg1"/>
+              </a:solidFill>
+              <a:ln w="19050">
                 <a:solidFill>
                   <a:schemeClr val="tx1"/>
                 </a:solidFill>
-                <a:latin typeface="Times New Roman" pitchFamily="18" charset="0"/>
-                <a:cs typeface="Times New Roman" pitchFamily="18" charset="0"/>
-              </a:endParaRPr>
-            </a:p>
-          </p:txBody>
-        </p:sp>
-        <p:sp>
-          <p:nvSpPr>
-            <p:cNvPr id="97" name="矩形 96"/>
-            <p:cNvSpPr/>
-            <p:nvPr/>
-          </p:nvSpPr>
-          <p:spPr>
-            <a:xfrm>
-              <a:off x="1115616" y="1838788"/>
-              <a:ext cx="1224136" cy="351656"/>
-            </a:xfrm>
-            <a:prstGeom prst="rect">
-              <a:avLst/>
-            </a:prstGeom>
-            <a:solidFill>
-              <a:schemeClr val="bg1">
-                <a:lumMod val="95000"/>
-              </a:schemeClr>
-            </a:solidFill>
-            <a:ln w="19050">
-              <a:solidFill>
-                <a:schemeClr val="tx1"/>
-              </a:solidFill>
-            </a:ln>
-          </p:spPr>
-          <p:style>
-            <a:lnRef idx="2">
-              <a:schemeClr val="accent1">
-                <a:shade val="50000"/>
-              </a:schemeClr>
-            </a:lnRef>
-            <a:fillRef idx="1">
-              <a:schemeClr val="accent1"/>
-            </a:fillRef>
-            <a:effectRef idx="0">
-              <a:schemeClr val="accent1"/>
-            </a:effectRef>
-            <a:fontRef idx="minor">
-              <a:schemeClr val="lt1"/>
-            </a:fontRef>
-          </p:style>
-          <p:txBody>
-            <a:bodyPr rtlCol="0" anchor="ctr"/>
-            <a:lstStyle/>
-            <a:p>
-              <a:pPr algn="ctr"/>
-              <a:r>
-                <a:rPr lang="en-US" altLang="zh-CN" sz="1600" dirty="0" smtClean="0">
+              </a:ln>
+            </p:spPr>
+            <p:style>
+              <a:lnRef idx="2">
+                <a:schemeClr val="accent1">
+                  <a:shade val="50000"/>
+                </a:schemeClr>
+              </a:lnRef>
+              <a:fillRef idx="1">
+                <a:schemeClr val="accent1"/>
+              </a:fillRef>
+              <a:effectRef idx="0">
+                <a:schemeClr val="accent1"/>
+              </a:effectRef>
+              <a:fontRef idx="minor">
+                <a:schemeClr val="lt1"/>
+              </a:fontRef>
+            </p:style>
+            <p:txBody>
+              <a:bodyPr rtlCol="0" anchor="ctr"/>
+              <a:lstStyle/>
+              <a:p>
+                <a:pPr algn="ctr"/>
+                <a:r>
+                  <a:rPr lang="en-US" altLang="zh-CN" sz="1600" dirty="0" smtClean="0">
+                    <a:solidFill>
+                      <a:schemeClr val="tx1"/>
+                    </a:solidFill>
+                    <a:latin typeface="Times New Roman" pitchFamily="18" charset="0"/>
+                    <a:cs typeface="Times New Roman" pitchFamily="18" charset="0"/>
+                  </a:rPr>
+                  <a:t>name</a:t>
+                </a:r>
+                <a:endParaRPr lang="zh-CN" altLang="en-US" sz="1600" dirty="0">
                   <a:solidFill>
                     <a:schemeClr val="tx1"/>
                   </a:solidFill>
                   <a:latin typeface="Times New Roman" pitchFamily="18" charset="0"/>
                   <a:cs typeface="Times New Roman" pitchFamily="18" charset="0"/>
-                </a:rPr>
-                <a:t>prototype</a:t>
-              </a:r>
-              <a:endParaRPr lang="zh-CN" altLang="en-US" sz="1600" dirty="0">
+                </a:endParaRPr>
+              </a:p>
+            </p:txBody>
+          </p:sp>
+          <p:sp>
+            <p:nvSpPr>
+              <p:cNvPr id="94" name="矩形 93"/>
+              <p:cNvSpPr/>
+              <p:nvPr/>
+            </p:nvSpPr>
+            <p:spPr>
+              <a:xfrm>
+                <a:off x="1772216" y="2018924"/>
+                <a:ext cx="1296000" cy="315772"/>
+              </a:xfrm>
+              <a:prstGeom prst="rect">
+                <a:avLst/>
+              </a:prstGeom>
+              <a:solidFill>
+                <a:schemeClr val="bg1"/>
+              </a:solidFill>
+              <a:ln w="19050">
                 <a:solidFill>
                   <a:schemeClr val="tx1"/>
                 </a:solidFill>
-                <a:latin typeface="Times New Roman" pitchFamily="18" charset="0"/>
-                <a:cs typeface="Times New Roman" pitchFamily="18" charset="0"/>
-              </a:endParaRPr>
-            </a:p>
-          </p:txBody>
-        </p:sp>
-      </p:grpSp>
-      <p:cxnSp>
-        <p:nvCxnSpPr>
-          <p:cNvPr id="67" name="肘形连接符 66"/>
-          <p:cNvCxnSpPr/>
-          <p:nvPr/>
-        </p:nvCxnSpPr>
-        <p:spPr>
-          <a:xfrm flipV="1">
-            <a:off x="2555562" y="1210622"/>
-            <a:ext cx="1406361" cy="346172"/>
-          </a:xfrm>
-          <a:prstGeom prst="bentConnector3">
-            <a:avLst>
-              <a:gd name="adj1" fmla="val 71131"/>
-            </a:avLst>
-          </a:prstGeom>
-          <a:ln w="19050">
-            <a:solidFill>
-              <a:schemeClr val="tx1"/>
-            </a:solidFill>
-            <a:headEnd type="oval" w="med" len="med"/>
-            <a:tailEnd type="triangle" w="lg" len="med"/>
-          </a:ln>
-        </p:spPr>
-        <p:style>
-          <a:lnRef idx="1">
-            <a:schemeClr val="accent1"/>
-          </a:lnRef>
-          <a:fillRef idx="0">
-            <a:schemeClr val="accent1"/>
-          </a:fillRef>
-          <a:effectRef idx="0">
-            <a:schemeClr val="accent1"/>
-          </a:effectRef>
-          <a:fontRef idx="minor">
-            <a:schemeClr val="tx1"/>
-          </a:fontRef>
-        </p:style>
-      </p:cxnSp>
-      <p:cxnSp>
-        <p:nvCxnSpPr>
-          <p:cNvPr id="69" name="直接连接符 68"/>
-          <p:cNvCxnSpPr/>
-          <p:nvPr/>
-        </p:nvCxnSpPr>
-        <p:spPr>
-          <a:xfrm>
-            <a:off x="3555216" y="2248056"/>
-            <a:ext cx="1" cy="676888"/>
-          </a:xfrm>
-          <a:prstGeom prst="line">
-            <a:avLst/>
-          </a:prstGeom>
-          <a:ln w="28575">
-            <a:solidFill>
-              <a:srgbClr val="FF0000"/>
-            </a:solidFill>
-            <a:prstDash val="solid"/>
-          </a:ln>
-        </p:spPr>
-        <p:style>
-          <a:lnRef idx="1">
-            <a:schemeClr val="accent1"/>
-          </a:lnRef>
-          <a:fillRef idx="0">
-            <a:schemeClr val="accent1"/>
-          </a:fillRef>
-          <a:effectRef idx="0">
-            <a:schemeClr val="accent1"/>
-          </a:effectRef>
-          <a:fontRef idx="minor">
-            <a:schemeClr val="tx1"/>
-          </a:fontRef>
-        </p:style>
-      </p:cxnSp>
-      <p:cxnSp>
-        <p:nvCxnSpPr>
-          <p:cNvPr id="70" name="肘形连接符 69"/>
-          <p:cNvCxnSpPr>
-            <a:endCxn id="88" idx="1"/>
-          </p:cNvCxnSpPr>
-          <p:nvPr/>
-        </p:nvCxnSpPr>
-        <p:spPr>
-          <a:xfrm rot="5400000" flipH="1" flipV="1">
-            <a:off x="3296342" y="1470551"/>
-            <a:ext cx="1034272" cy="516523"/>
-          </a:xfrm>
-          <a:prstGeom prst="bentConnector2">
-            <a:avLst/>
-          </a:prstGeom>
-          <a:ln w="28575">
-            <a:solidFill>
-              <a:srgbClr val="FF0000"/>
-            </a:solidFill>
-            <a:headEnd type="none" w="med" len="med"/>
-            <a:tailEnd type="triangle" w="lg" len="med"/>
-          </a:ln>
-        </p:spPr>
-        <p:style>
-          <a:lnRef idx="1">
-            <a:schemeClr val="accent1"/>
-          </a:lnRef>
-          <a:fillRef idx="0">
-            <a:schemeClr val="accent1"/>
-          </a:fillRef>
-          <a:effectRef idx="0">
-            <a:schemeClr val="accent1"/>
-          </a:effectRef>
-          <a:fontRef idx="minor">
-            <a:schemeClr val="tx1"/>
-          </a:fontRef>
-        </p:style>
-      </p:cxnSp>
-      <p:grpSp>
-        <p:nvGrpSpPr>
-          <p:cNvPr id="72" name="组合 71"/>
-          <p:cNvGrpSpPr/>
-          <p:nvPr/>
-        </p:nvGrpSpPr>
-        <p:grpSpPr>
-          <a:xfrm>
-            <a:off x="611560" y="5733256"/>
-            <a:ext cx="2592000" cy="949660"/>
-            <a:chOff x="476216" y="1385036"/>
-            <a:chExt cx="2592000" cy="949660"/>
-          </a:xfrm>
-        </p:grpSpPr>
-        <p:sp>
-          <p:nvSpPr>
-            <p:cNvPr id="90" name="矩形 89"/>
-            <p:cNvSpPr/>
-            <p:nvPr/>
-          </p:nvSpPr>
-          <p:spPr>
-            <a:xfrm>
-              <a:off x="476216" y="1391312"/>
-              <a:ext cx="2592000" cy="942908"/>
-            </a:xfrm>
-            <a:prstGeom prst="rect">
-              <a:avLst/>
-            </a:prstGeom>
-            <a:solidFill>
-              <a:schemeClr val="bg1">
-                <a:lumMod val="95000"/>
-              </a:schemeClr>
-            </a:solidFill>
-            <a:ln w="19050">
-              <a:solidFill>
-                <a:schemeClr val="tx1"/>
-              </a:solidFill>
-            </a:ln>
-          </p:spPr>
-          <p:style>
-            <a:lnRef idx="2">
-              <a:schemeClr val="accent1">
-                <a:shade val="50000"/>
-              </a:schemeClr>
-            </a:lnRef>
-            <a:fillRef idx="1">
-              <a:schemeClr val="accent1"/>
-            </a:fillRef>
-            <a:effectRef idx="0">
-              <a:schemeClr val="accent1"/>
-            </a:effectRef>
-            <a:fontRef idx="minor">
-              <a:schemeClr val="lt1"/>
-            </a:fontRef>
-          </p:style>
-          <p:txBody>
-            <a:bodyPr rtlCol="0" anchor="ctr"/>
-            <a:lstStyle/>
-            <a:p>
-              <a:pPr algn="ctr"/>
-              <a:endParaRPr lang="zh-CN" altLang="en-US">
-                <a:latin typeface="Times New Roman" pitchFamily="18" charset="0"/>
-                <a:cs typeface="Times New Roman" pitchFamily="18" charset="0"/>
-              </a:endParaRPr>
-            </a:p>
-          </p:txBody>
-        </p:sp>
-        <p:sp>
-          <p:nvSpPr>
-            <p:cNvPr id="91" name="矩形 90"/>
-            <p:cNvSpPr/>
-            <p:nvPr/>
-          </p:nvSpPr>
-          <p:spPr>
-            <a:xfrm>
-              <a:off x="476216" y="1385036"/>
-              <a:ext cx="2592000" cy="315772"/>
-            </a:xfrm>
-            <a:prstGeom prst="rect">
-              <a:avLst/>
-            </a:prstGeom>
-            <a:solidFill>
-              <a:schemeClr val="accent5">
-                <a:lumMod val="40000"/>
-                <a:lumOff val="60000"/>
-              </a:schemeClr>
-            </a:solidFill>
-            <a:ln w="19050">
-              <a:solidFill>
-                <a:schemeClr val="tx1"/>
-              </a:solidFill>
-            </a:ln>
-          </p:spPr>
-          <p:style>
-            <a:lnRef idx="2">
-              <a:schemeClr val="accent1">
-                <a:shade val="50000"/>
-              </a:schemeClr>
-            </a:lnRef>
-            <a:fillRef idx="1">
-              <a:schemeClr val="accent1"/>
-            </a:fillRef>
-            <a:effectRef idx="0">
-              <a:schemeClr val="accent1"/>
-            </a:effectRef>
-            <a:fontRef idx="minor">
-              <a:schemeClr val="lt1"/>
-            </a:fontRef>
-          </p:style>
-          <p:txBody>
-            <a:bodyPr rtlCol="0" anchor="ctr"/>
-            <a:lstStyle/>
-            <a:p>
-              <a:pPr algn="ctr"/>
-              <a:r>
-                <a:rPr lang="en-US" altLang="zh-CN" dirty="0" smtClean="0">
+              </a:ln>
+            </p:spPr>
+            <p:style>
+              <a:lnRef idx="2">
+                <a:schemeClr val="accent1">
+                  <a:shade val="50000"/>
+                </a:schemeClr>
+              </a:lnRef>
+              <a:fillRef idx="1">
+                <a:schemeClr val="accent1"/>
+              </a:fillRef>
+              <a:effectRef idx="0">
+                <a:schemeClr val="accent1"/>
+              </a:effectRef>
+              <a:fontRef idx="minor">
+                <a:schemeClr val="lt1"/>
+              </a:fontRef>
+            </p:style>
+            <p:txBody>
+              <a:bodyPr rtlCol="0" anchor="ctr"/>
+              <a:lstStyle/>
+              <a:p>
+                <a:pPr algn="ctr"/>
+                <a:r>
+                  <a:rPr lang="en-US" altLang="zh-CN" sz="1600" dirty="0" smtClean="0">
+                    <a:solidFill>
+                      <a:schemeClr val="tx1"/>
+                    </a:solidFill>
+                    <a:latin typeface="Times New Roman" pitchFamily="18" charset="0"/>
+                    <a:cs typeface="Times New Roman" pitchFamily="18" charset="0"/>
+                  </a:rPr>
+                  <a:t>“</a:t>
+                </a:r>
+                <a:r>
+                  <a:rPr lang="en-US" altLang="zh-CN" sz="1600" dirty="0" err="1" smtClean="0">
+                    <a:solidFill>
+                      <a:schemeClr val="tx1"/>
+                    </a:solidFill>
+                    <a:latin typeface="Times New Roman" pitchFamily="18" charset="0"/>
+                    <a:cs typeface="Times New Roman" pitchFamily="18" charset="0"/>
+                  </a:rPr>
+                  <a:t>hua</a:t>
+                </a:r>
+                <a:r>
+                  <a:rPr lang="en-US" altLang="zh-CN" sz="1600" dirty="0" smtClean="0">
+                    <a:solidFill>
+                      <a:schemeClr val="tx1"/>
+                    </a:solidFill>
+                    <a:latin typeface="Times New Roman" pitchFamily="18" charset="0"/>
+                    <a:cs typeface="Times New Roman" pitchFamily="18" charset="0"/>
+                  </a:rPr>
+                  <a:t>”</a:t>
+                </a:r>
+                <a:endParaRPr lang="zh-CN" altLang="en-US" sz="1600" dirty="0">
                   <a:solidFill>
                     <a:schemeClr val="tx1"/>
                   </a:solidFill>
                   <a:latin typeface="Times New Roman" pitchFamily="18" charset="0"/>
                   <a:cs typeface="Times New Roman" pitchFamily="18" charset="0"/>
-                </a:rPr>
-                <a:t>person1</a:t>
-              </a:r>
-              <a:endParaRPr lang="zh-CN" altLang="en-US" dirty="0">
+                </a:endParaRPr>
+              </a:p>
+            </p:txBody>
+          </p:sp>
+        </p:grpSp>
+        <p:grpSp>
+          <p:nvGrpSpPr>
+            <p:cNvPr id="2" name="组合 1"/>
+            <p:cNvGrpSpPr/>
+            <p:nvPr/>
+          </p:nvGrpSpPr>
+          <p:grpSpPr>
+            <a:xfrm>
+              <a:off x="4071740" y="4509120"/>
+              <a:ext cx="2592547" cy="899318"/>
+              <a:chOff x="4071741" y="4135760"/>
+              <a:chExt cx="2592547" cy="899318"/>
+            </a:xfrm>
+          </p:grpSpPr>
+          <p:sp>
+            <p:nvSpPr>
+              <p:cNvPr id="57" name="矩形 56"/>
+              <p:cNvSpPr/>
+              <p:nvPr/>
+            </p:nvSpPr>
+            <p:spPr>
+              <a:xfrm>
+                <a:off x="4071741" y="4135760"/>
+                <a:ext cx="2592000" cy="898842"/>
+              </a:xfrm>
+              <a:prstGeom prst="rect">
+                <a:avLst/>
+              </a:prstGeom>
+              <a:solidFill>
+                <a:schemeClr val="bg1">
+                  <a:lumMod val="95000"/>
+                </a:schemeClr>
+              </a:solidFill>
+              <a:ln w="19050">
                 <a:solidFill>
                   <a:schemeClr val="tx1"/>
                 </a:solidFill>
-                <a:latin typeface="Times New Roman" pitchFamily="18" charset="0"/>
-                <a:cs typeface="Times New Roman" pitchFamily="18" charset="0"/>
-              </a:endParaRPr>
-            </a:p>
-          </p:txBody>
-        </p:sp>
-        <p:sp>
-          <p:nvSpPr>
-            <p:cNvPr id="92" name="矩形 91"/>
-            <p:cNvSpPr/>
-            <p:nvPr/>
-          </p:nvSpPr>
-          <p:spPr>
-            <a:xfrm>
-              <a:off x="476216" y="1700808"/>
-              <a:ext cx="1296000" cy="315772"/>
-            </a:xfrm>
-            <a:prstGeom prst="rect">
-              <a:avLst/>
-            </a:prstGeom>
-            <a:solidFill>
-              <a:schemeClr val="bg1">
-                <a:lumMod val="95000"/>
-              </a:schemeClr>
-            </a:solidFill>
-            <a:ln w="19050">
+              </a:ln>
+            </p:spPr>
+            <p:style>
+              <a:lnRef idx="2">
+                <a:schemeClr val="accent1">
+                  <a:shade val="50000"/>
+                </a:schemeClr>
+              </a:lnRef>
+              <a:fillRef idx="1">
+                <a:schemeClr val="accent1"/>
+              </a:fillRef>
+              <a:effectRef idx="0">
+                <a:schemeClr val="accent1"/>
+              </a:effectRef>
+              <a:fontRef idx="minor">
+                <a:schemeClr val="lt1"/>
+              </a:fontRef>
+            </p:style>
+            <p:txBody>
+              <a:bodyPr rtlCol="0" anchor="ctr"/>
+              <a:lstStyle/>
+              <a:p>
+                <a:pPr algn="ctr"/>
+                <a:endParaRPr lang="zh-CN" altLang="en-US">
+                  <a:latin typeface="Times New Roman" pitchFamily="18" charset="0"/>
+                  <a:cs typeface="Times New Roman" pitchFamily="18" charset="0"/>
+                </a:endParaRPr>
+              </a:p>
+            </p:txBody>
+          </p:sp>
+          <p:sp>
+            <p:nvSpPr>
+              <p:cNvPr id="58" name="矩形 57"/>
+              <p:cNvSpPr/>
+              <p:nvPr/>
+            </p:nvSpPr>
+            <p:spPr>
+              <a:xfrm>
+                <a:off x="4071741" y="4135760"/>
+                <a:ext cx="2592000" cy="315772"/>
+              </a:xfrm>
+              <a:prstGeom prst="rect">
+                <a:avLst/>
+              </a:prstGeom>
               <a:solidFill>
-                <a:schemeClr val="tx1"/>
+                <a:schemeClr val="accent5">
+                  <a:lumMod val="40000"/>
+                  <a:lumOff val="60000"/>
+                </a:schemeClr>
               </a:solidFill>
-            </a:ln>
-          </p:spPr>
-          <p:style>
-            <a:lnRef idx="2">
-              <a:schemeClr val="accent1">
-                <a:shade val="50000"/>
-              </a:schemeClr>
-            </a:lnRef>
-            <a:fillRef idx="1">
-              <a:schemeClr val="accent1"/>
-            </a:fillRef>
-            <a:effectRef idx="0">
-              <a:schemeClr val="accent1"/>
-            </a:effectRef>
-            <a:fontRef idx="minor">
-              <a:schemeClr val="lt1"/>
-            </a:fontRef>
-          </p:style>
-          <p:txBody>
-            <a:bodyPr rtlCol="0" anchor="ctr"/>
-            <a:lstStyle/>
-            <a:p>
-              <a:pPr algn="ctr"/>
-              <a:r>
-                <a:rPr lang="en-US" altLang="zh-CN" sz="1600" dirty="0" smtClean="0">
+              <a:ln w="19050">
+                <a:solidFill>
+                  <a:schemeClr val="tx1"/>
+                </a:solidFill>
+              </a:ln>
+            </p:spPr>
+            <p:style>
+              <a:lnRef idx="2">
+                <a:schemeClr val="accent1">
+                  <a:shade val="50000"/>
+                </a:schemeClr>
+              </a:lnRef>
+              <a:fillRef idx="1">
+                <a:schemeClr val="accent1"/>
+              </a:fillRef>
+              <a:effectRef idx="0">
+                <a:schemeClr val="accent1"/>
+              </a:effectRef>
+              <a:fontRef idx="minor">
+                <a:schemeClr val="lt1"/>
+              </a:fontRef>
+            </p:style>
+            <p:txBody>
+              <a:bodyPr rtlCol="0" anchor="ctr"/>
+              <a:lstStyle/>
+              <a:p>
+                <a:pPr algn="ctr"/>
+                <a:r>
+                  <a:rPr lang="zh-CN" altLang="en-US" dirty="0" smtClean="0">
+                    <a:solidFill>
+                      <a:schemeClr val="tx1"/>
+                    </a:solidFill>
+                    <a:latin typeface="Times New Roman" pitchFamily="18" charset="0"/>
+                    <a:cs typeface="Times New Roman" pitchFamily="18" charset="0"/>
+                  </a:rPr>
+                  <a:t>新的</a:t>
+                </a:r>
+                <a:r>
+                  <a:rPr lang="en-US" altLang="zh-CN" dirty="0" smtClean="0">
+                    <a:solidFill>
+                      <a:schemeClr val="tx1"/>
+                    </a:solidFill>
+                    <a:latin typeface="Times New Roman" pitchFamily="18" charset="0"/>
+                    <a:cs typeface="Times New Roman" pitchFamily="18" charset="0"/>
+                  </a:rPr>
+                  <a:t>Person Prototype</a:t>
+                </a:r>
+                <a:endParaRPr lang="zh-CN" altLang="en-US" dirty="0">
                   <a:solidFill>
                     <a:schemeClr val="tx1"/>
                   </a:solidFill>
                   <a:latin typeface="Times New Roman" pitchFamily="18" charset="0"/>
                   <a:cs typeface="Times New Roman" pitchFamily="18" charset="0"/>
-                </a:rPr>
-                <a:t>[[Prototype]]</a:t>
-              </a:r>
-              <a:endParaRPr lang="zh-CN" altLang="en-US" sz="1600" dirty="0">
+                </a:endParaRPr>
+              </a:p>
+            </p:txBody>
+          </p:sp>
+          <p:sp>
+            <p:nvSpPr>
+              <p:cNvPr id="65" name="矩形 64"/>
+              <p:cNvSpPr/>
+              <p:nvPr/>
+            </p:nvSpPr>
+            <p:spPr>
+              <a:xfrm>
+                <a:off x="4072288" y="4424572"/>
+                <a:ext cx="1296000" cy="315772"/>
+              </a:xfrm>
+              <a:prstGeom prst="rect">
+                <a:avLst/>
+              </a:prstGeom>
+              <a:solidFill>
+                <a:schemeClr val="bg1">
+                  <a:lumMod val="95000"/>
+                </a:schemeClr>
+              </a:solidFill>
+              <a:ln w="19050">
                 <a:solidFill>
                   <a:schemeClr val="tx1"/>
                 </a:solidFill>
-                <a:latin typeface="Times New Roman" pitchFamily="18" charset="0"/>
-                <a:cs typeface="Times New Roman" pitchFamily="18" charset="0"/>
-              </a:endParaRPr>
-            </a:p>
-          </p:txBody>
-        </p:sp>
-        <p:sp>
-          <p:nvSpPr>
-            <p:cNvPr id="93" name="矩形 92"/>
-            <p:cNvSpPr/>
-            <p:nvPr/>
-          </p:nvSpPr>
-          <p:spPr>
-            <a:xfrm>
-              <a:off x="476216" y="2018448"/>
-              <a:ext cx="1296000" cy="315772"/>
-            </a:xfrm>
-            <a:prstGeom prst="rect">
-              <a:avLst/>
-            </a:prstGeom>
-            <a:solidFill>
-              <a:schemeClr val="bg1"/>
-            </a:solidFill>
-            <a:ln w="19050">
-              <a:solidFill>
-                <a:schemeClr val="tx1"/>
-              </a:solidFill>
-            </a:ln>
-          </p:spPr>
-          <p:style>
-            <a:lnRef idx="2">
-              <a:schemeClr val="accent1">
-                <a:shade val="50000"/>
-              </a:schemeClr>
-            </a:lnRef>
-            <a:fillRef idx="1">
-              <a:schemeClr val="accent1"/>
-            </a:fillRef>
-            <a:effectRef idx="0">
-              <a:schemeClr val="accent1"/>
-            </a:effectRef>
-            <a:fontRef idx="minor">
-              <a:schemeClr val="lt1"/>
-            </a:fontRef>
-          </p:style>
-          <p:txBody>
-            <a:bodyPr rtlCol="0" anchor="ctr"/>
-            <a:lstStyle/>
-            <a:p>
-              <a:pPr algn="ctr"/>
-              <a:r>
-                <a:rPr lang="en-US" altLang="zh-CN" sz="1600" dirty="0" smtClean="0">
+              </a:ln>
+            </p:spPr>
+            <p:style>
+              <a:lnRef idx="2">
+                <a:schemeClr val="accent1">
+                  <a:shade val="50000"/>
+                </a:schemeClr>
+              </a:lnRef>
+              <a:fillRef idx="1">
+                <a:schemeClr val="accent1"/>
+              </a:fillRef>
+              <a:effectRef idx="0">
+                <a:schemeClr val="accent1"/>
+              </a:effectRef>
+              <a:fontRef idx="minor">
+                <a:schemeClr val="lt1"/>
+              </a:fontRef>
+            </p:style>
+            <p:txBody>
+              <a:bodyPr rtlCol="0" anchor="ctr"/>
+              <a:lstStyle/>
+              <a:p>
+                <a:pPr algn="ctr"/>
+                <a:r>
+                  <a:rPr lang="en-US" altLang="zh-CN" sz="1600" dirty="0" smtClean="0">
+                    <a:solidFill>
+                      <a:schemeClr val="tx1"/>
+                    </a:solidFill>
+                    <a:latin typeface="Times New Roman" pitchFamily="18" charset="0"/>
+                    <a:cs typeface="Times New Roman" pitchFamily="18" charset="0"/>
+                  </a:rPr>
+                  <a:t>[[prototype]]</a:t>
+                </a:r>
+                <a:endParaRPr lang="zh-CN" altLang="en-US" sz="1600" dirty="0">
                   <a:solidFill>
                     <a:schemeClr val="tx1"/>
                   </a:solidFill>
                   <a:latin typeface="Times New Roman" pitchFamily="18" charset="0"/>
                   <a:cs typeface="Times New Roman" pitchFamily="18" charset="0"/>
-                </a:rPr>
-                <a:t>name</a:t>
-              </a:r>
-              <a:endParaRPr lang="zh-CN" altLang="en-US" sz="1600" dirty="0">
+                </a:endParaRPr>
+              </a:p>
+            </p:txBody>
+          </p:sp>
+          <p:sp>
+            <p:nvSpPr>
+              <p:cNvPr id="66" name="矩形 65"/>
+              <p:cNvSpPr/>
+              <p:nvPr/>
+            </p:nvSpPr>
+            <p:spPr>
+              <a:xfrm>
+                <a:off x="5368288" y="4424221"/>
+                <a:ext cx="1296000" cy="315772"/>
+              </a:xfrm>
+              <a:prstGeom prst="rect">
+                <a:avLst/>
+              </a:prstGeom>
+              <a:solidFill>
+                <a:schemeClr val="bg1">
+                  <a:lumMod val="95000"/>
+                </a:schemeClr>
+              </a:solidFill>
+              <a:ln w="19050">
                 <a:solidFill>
                   <a:schemeClr val="tx1"/>
                 </a:solidFill>
-                <a:latin typeface="Times New Roman" pitchFamily="18" charset="0"/>
-                <a:cs typeface="Times New Roman" pitchFamily="18" charset="0"/>
-              </a:endParaRPr>
-            </a:p>
-          </p:txBody>
-        </p:sp>
-        <p:sp>
-          <p:nvSpPr>
-            <p:cNvPr id="94" name="矩形 93"/>
-            <p:cNvSpPr/>
-            <p:nvPr/>
-          </p:nvSpPr>
-          <p:spPr>
-            <a:xfrm>
-              <a:off x="1772216" y="2018924"/>
-              <a:ext cx="1296000" cy="315772"/>
-            </a:xfrm>
-            <a:prstGeom prst="rect">
-              <a:avLst/>
-            </a:prstGeom>
-            <a:solidFill>
-              <a:schemeClr val="bg1"/>
-            </a:solidFill>
-            <a:ln w="19050">
-              <a:solidFill>
-                <a:schemeClr val="tx1"/>
-              </a:solidFill>
-            </a:ln>
-          </p:spPr>
-          <p:style>
-            <a:lnRef idx="2">
-              <a:schemeClr val="accent1">
-                <a:shade val="50000"/>
-              </a:schemeClr>
-            </a:lnRef>
-            <a:fillRef idx="1">
-              <a:schemeClr val="accent1"/>
-            </a:fillRef>
-            <a:effectRef idx="0">
-              <a:schemeClr val="accent1"/>
-            </a:effectRef>
-            <a:fontRef idx="minor">
-              <a:schemeClr val="lt1"/>
-            </a:fontRef>
-          </p:style>
-          <p:txBody>
-            <a:bodyPr rtlCol="0" anchor="ctr"/>
-            <a:lstStyle/>
-            <a:p>
-              <a:pPr algn="ctr"/>
-              <a:r>
-                <a:rPr lang="en-US" altLang="zh-CN" sz="1600" dirty="0" smtClean="0">
+              </a:ln>
+            </p:spPr>
+            <p:style>
+              <a:lnRef idx="2">
+                <a:schemeClr val="accent1">
+                  <a:shade val="50000"/>
+                </a:schemeClr>
+              </a:lnRef>
+              <a:fillRef idx="1">
+                <a:schemeClr val="accent1"/>
+              </a:fillRef>
+              <a:effectRef idx="0">
+                <a:schemeClr val="accent1"/>
+              </a:effectRef>
+              <a:fontRef idx="minor">
+                <a:schemeClr val="lt1"/>
+              </a:fontRef>
+            </p:style>
+            <p:txBody>
+              <a:bodyPr rtlCol="0" anchor="ctr"/>
+              <a:lstStyle/>
+              <a:p>
+                <a:pPr algn="ctr"/>
+                <a:endParaRPr lang="zh-CN" altLang="en-US" sz="1600" dirty="0">
                   <a:solidFill>
                     <a:schemeClr val="tx1"/>
                   </a:solidFill>
                   <a:latin typeface="Times New Roman" pitchFamily="18" charset="0"/>
                   <a:cs typeface="Times New Roman" pitchFamily="18" charset="0"/>
-                </a:rPr>
-                <a:t>“</a:t>
-              </a:r>
-              <a:r>
-                <a:rPr lang="en-US" altLang="zh-CN" sz="1600" dirty="0" err="1" smtClean="0">
+                </a:endParaRPr>
+              </a:p>
+            </p:txBody>
+          </p:sp>
+          <p:sp>
+            <p:nvSpPr>
+              <p:cNvPr id="74" name="矩形 73"/>
+              <p:cNvSpPr/>
+              <p:nvPr/>
+            </p:nvSpPr>
+            <p:spPr>
+              <a:xfrm>
+                <a:off x="4072288" y="4718830"/>
+                <a:ext cx="1296000" cy="315772"/>
+              </a:xfrm>
+              <a:prstGeom prst="rect">
+                <a:avLst/>
+              </a:prstGeom>
+              <a:solidFill>
+                <a:schemeClr val="bg1"/>
+              </a:solidFill>
+              <a:ln w="19050">
+                <a:solidFill>
+                  <a:schemeClr val="tx1"/>
+                </a:solidFill>
+              </a:ln>
+            </p:spPr>
+            <p:style>
+              <a:lnRef idx="2">
+                <a:schemeClr val="accent1">
+                  <a:shade val="50000"/>
+                </a:schemeClr>
+              </a:lnRef>
+              <a:fillRef idx="1">
+                <a:schemeClr val="accent1"/>
+              </a:fillRef>
+              <a:effectRef idx="0">
+                <a:schemeClr val="accent1"/>
+              </a:effectRef>
+              <a:fontRef idx="minor">
+                <a:schemeClr val="lt1"/>
+              </a:fontRef>
+            </p:style>
+            <p:txBody>
+              <a:bodyPr rtlCol="0" anchor="ctr"/>
+              <a:lstStyle/>
+              <a:p>
+                <a:pPr algn="ctr"/>
+                <a:r>
+                  <a:rPr lang="en-US" altLang="zh-CN" sz="1600" dirty="0" err="1" smtClean="0">
+                    <a:solidFill>
+                      <a:schemeClr val="tx1"/>
+                    </a:solidFill>
+                    <a:latin typeface="Times New Roman" pitchFamily="18" charset="0"/>
+                    <a:cs typeface="Times New Roman" pitchFamily="18" charset="0"/>
+                  </a:rPr>
+                  <a:t>sayName</a:t>
+                </a:r>
+                <a:endParaRPr lang="zh-CN" altLang="en-US" sz="1600" dirty="0">
                   <a:solidFill>
                     <a:schemeClr val="tx1"/>
                   </a:solidFill>
                   <a:latin typeface="Times New Roman" pitchFamily="18" charset="0"/>
                   <a:cs typeface="Times New Roman" pitchFamily="18" charset="0"/>
-                </a:rPr>
-                <a:t>hua</a:t>
-              </a:r>
-              <a:r>
-                <a:rPr lang="en-US" altLang="zh-CN" sz="1600" dirty="0" smtClean="0">
+                </a:endParaRPr>
+              </a:p>
+            </p:txBody>
+          </p:sp>
+          <p:sp>
+            <p:nvSpPr>
+              <p:cNvPr id="76" name="矩形 75"/>
+              <p:cNvSpPr/>
+              <p:nvPr/>
+            </p:nvSpPr>
+            <p:spPr>
+              <a:xfrm>
+                <a:off x="5368288" y="4719306"/>
+                <a:ext cx="1296000" cy="315772"/>
+              </a:xfrm>
+              <a:prstGeom prst="rect">
+                <a:avLst/>
+              </a:prstGeom>
+              <a:solidFill>
+                <a:schemeClr val="bg1"/>
+              </a:solidFill>
+              <a:ln w="19050">
+                <a:solidFill>
+                  <a:schemeClr val="tx1"/>
+                </a:solidFill>
+              </a:ln>
+            </p:spPr>
+            <p:style>
+              <a:lnRef idx="2">
+                <a:schemeClr val="accent1">
+                  <a:shade val="50000"/>
+                </a:schemeClr>
+              </a:lnRef>
+              <a:fillRef idx="1">
+                <a:schemeClr val="accent1"/>
+              </a:fillRef>
+              <a:effectRef idx="0">
+                <a:schemeClr val="accent1"/>
+              </a:effectRef>
+              <a:fontRef idx="minor">
+                <a:schemeClr val="lt1"/>
+              </a:fontRef>
+            </p:style>
+            <p:txBody>
+              <a:bodyPr rtlCol="0" anchor="ctr"/>
+              <a:lstStyle/>
+              <a:p>
+                <a:pPr algn="ctr"/>
+                <a:r>
+                  <a:rPr lang="en-US" altLang="zh-CN" sz="1600" dirty="0" smtClean="0">
+                    <a:solidFill>
+                      <a:schemeClr val="tx1"/>
+                    </a:solidFill>
+                    <a:latin typeface="Times New Roman" pitchFamily="18" charset="0"/>
+                    <a:cs typeface="Times New Roman" pitchFamily="18" charset="0"/>
+                  </a:rPr>
+                  <a:t>(function)</a:t>
+                </a:r>
+                <a:endParaRPr lang="zh-CN" altLang="en-US" sz="1600" dirty="0">
                   <a:solidFill>
                     <a:schemeClr val="tx1"/>
                   </a:solidFill>
                   <a:latin typeface="Times New Roman" pitchFamily="18" charset="0"/>
                   <a:cs typeface="Times New Roman" pitchFamily="18" charset="0"/>
-                </a:rPr>
-                <a:t>”</a:t>
-              </a:r>
-              <a:endParaRPr lang="zh-CN" altLang="en-US" sz="1600" dirty="0">
-                <a:solidFill>
-                  <a:schemeClr val="tx1"/>
-                </a:solidFill>
-                <a:latin typeface="Times New Roman" pitchFamily="18" charset="0"/>
-                <a:cs typeface="Times New Roman" pitchFamily="18" charset="0"/>
-              </a:endParaRPr>
-            </a:p>
-          </p:txBody>
-        </p:sp>
-      </p:grpSp>
-      <p:grpSp>
-        <p:nvGrpSpPr>
-          <p:cNvPr id="2" name="组合 1"/>
-          <p:cNvGrpSpPr/>
-          <p:nvPr/>
-        </p:nvGrpSpPr>
-        <p:grpSpPr>
-          <a:xfrm>
-            <a:off x="4071740" y="4509120"/>
-            <a:ext cx="2592000" cy="1237456"/>
-            <a:chOff x="4071741" y="4135760"/>
-            <a:chExt cx="2592000" cy="1237456"/>
-          </a:xfrm>
-        </p:grpSpPr>
-        <p:sp>
-          <p:nvSpPr>
-            <p:cNvPr id="57" name="矩形 56"/>
-            <p:cNvSpPr/>
-            <p:nvPr/>
-          </p:nvSpPr>
-          <p:spPr>
-            <a:xfrm>
-              <a:off x="4071741" y="4135760"/>
-              <a:ext cx="2592000" cy="1236980"/>
-            </a:xfrm>
-            <a:prstGeom prst="rect">
-              <a:avLst/>
-            </a:prstGeom>
-            <a:solidFill>
-              <a:schemeClr val="bg1">
-                <a:lumMod val="95000"/>
-              </a:schemeClr>
-            </a:solidFill>
-            <a:ln w="19050">
-              <a:solidFill>
-                <a:schemeClr val="tx1"/>
-              </a:solidFill>
-            </a:ln>
-          </p:spPr>
-          <p:style>
-            <a:lnRef idx="2">
-              <a:schemeClr val="accent1">
-                <a:shade val="50000"/>
-              </a:schemeClr>
-            </a:lnRef>
-            <a:fillRef idx="1">
-              <a:schemeClr val="accent1"/>
-            </a:fillRef>
-            <a:effectRef idx="0">
-              <a:schemeClr val="accent1"/>
-            </a:effectRef>
-            <a:fontRef idx="minor">
-              <a:schemeClr val="lt1"/>
-            </a:fontRef>
-          </p:style>
-          <p:txBody>
-            <a:bodyPr rtlCol="0" anchor="ctr"/>
-            <a:lstStyle/>
-            <a:p>
-              <a:pPr algn="ctr"/>
-              <a:endParaRPr lang="zh-CN" altLang="en-US">
-                <a:latin typeface="Times New Roman" pitchFamily="18" charset="0"/>
-                <a:cs typeface="Times New Roman" pitchFamily="18" charset="0"/>
-              </a:endParaRPr>
-            </a:p>
-          </p:txBody>
-        </p:sp>
-        <p:sp>
-          <p:nvSpPr>
-            <p:cNvPr id="58" name="矩形 57"/>
-            <p:cNvSpPr/>
-            <p:nvPr/>
-          </p:nvSpPr>
-          <p:spPr>
-            <a:xfrm>
-              <a:off x="4071741" y="4135760"/>
-              <a:ext cx="2592000" cy="315772"/>
-            </a:xfrm>
-            <a:prstGeom prst="rect">
-              <a:avLst/>
-            </a:prstGeom>
-            <a:solidFill>
-              <a:schemeClr val="accent5">
-                <a:lumMod val="40000"/>
-                <a:lumOff val="60000"/>
-              </a:schemeClr>
-            </a:solidFill>
-            <a:ln w="19050">
-              <a:solidFill>
-                <a:schemeClr val="tx1"/>
-              </a:solidFill>
-            </a:ln>
-          </p:spPr>
-          <p:style>
-            <a:lnRef idx="2">
-              <a:schemeClr val="accent1">
-                <a:shade val="50000"/>
-              </a:schemeClr>
-            </a:lnRef>
-            <a:fillRef idx="1">
-              <a:schemeClr val="accent1"/>
-            </a:fillRef>
-            <a:effectRef idx="0">
-              <a:schemeClr val="accent1"/>
-            </a:effectRef>
-            <a:fontRef idx="minor">
-              <a:schemeClr val="lt1"/>
-            </a:fontRef>
-          </p:style>
-          <p:txBody>
-            <a:bodyPr rtlCol="0" anchor="ctr"/>
-            <a:lstStyle/>
-            <a:p>
-              <a:pPr algn="ctr"/>
-              <a:r>
-                <a:rPr lang="zh-CN" altLang="en-US" dirty="0" smtClean="0">
-                  <a:solidFill>
-                    <a:schemeClr val="tx1"/>
-                  </a:solidFill>
-                  <a:latin typeface="Times New Roman" pitchFamily="18" charset="0"/>
-                  <a:cs typeface="Times New Roman" pitchFamily="18" charset="0"/>
-                </a:rPr>
-                <a:t>新的</a:t>
-              </a:r>
-              <a:r>
-                <a:rPr lang="en-US" altLang="zh-CN" dirty="0" smtClean="0">
-                  <a:solidFill>
-                    <a:schemeClr val="tx1"/>
-                  </a:solidFill>
-                  <a:latin typeface="Times New Roman" pitchFamily="18" charset="0"/>
-                  <a:cs typeface="Times New Roman" pitchFamily="18" charset="0"/>
-                </a:rPr>
-                <a:t>Person Prototype</a:t>
-              </a:r>
-              <a:endParaRPr lang="zh-CN" altLang="en-US" dirty="0">
-                <a:solidFill>
-                  <a:schemeClr val="tx1"/>
-                </a:solidFill>
-                <a:latin typeface="Times New Roman" pitchFamily="18" charset="0"/>
-                <a:cs typeface="Times New Roman" pitchFamily="18" charset="0"/>
-              </a:endParaRPr>
-            </a:p>
-          </p:txBody>
-        </p:sp>
-        <p:sp>
-          <p:nvSpPr>
-            <p:cNvPr id="59" name="矩形 58"/>
-            <p:cNvSpPr/>
-            <p:nvPr/>
-          </p:nvSpPr>
-          <p:spPr>
-            <a:xfrm>
-              <a:off x="4071741" y="4451531"/>
-              <a:ext cx="1296000" cy="310827"/>
-            </a:xfrm>
-            <a:prstGeom prst="rect">
-              <a:avLst/>
-            </a:prstGeom>
-            <a:solidFill>
-              <a:schemeClr val="bg1">
-                <a:lumMod val="95000"/>
-              </a:schemeClr>
-            </a:solidFill>
-            <a:ln w="19050">
-              <a:solidFill>
-                <a:schemeClr val="tx1"/>
-              </a:solidFill>
-            </a:ln>
-          </p:spPr>
-          <p:style>
-            <a:lnRef idx="2">
-              <a:schemeClr val="accent1">
-                <a:shade val="50000"/>
-              </a:schemeClr>
-            </a:lnRef>
-            <a:fillRef idx="1">
-              <a:schemeClr val="accent1"/>
-            </a:fillRef>
-            <a:effectRef idx="0">
-              <a:schemeClr val="accent1"/>
-            </a:effectRef>
-            <a:fontRef idx="minor">
-              <a:schemeClr val="lt1"/>
-            </a:fontRef>
-          </p:style>
-          <p:txBody>
-            <a:bodyPr rtlCol="0" anchor="ctr"/>
-            <a:lstStyle/>
-            <a:p>
-              <a:pPr algn="ctr"/>
-              <a:r>
-                <a:rPr lang="en-US" altLang="zh-CN" sz="1600" dirty="0" smtClean="0">
-                  <a:solidFill>
-                    <a:schemeClr val="tx1"/>
-                  </a:solidFill>
-                  <a:latin typeface="Times New Roman" pitchFamily="18" charset="0"/>
-                  <a:cs typeface="Times New Roman" pitchFamily="18" charset="0"/>
-                </a:rPr>
-                <a:t>constructor</a:t>
-              </a:r>
-              <a:endParaRPr lang="zh-CN" altLang="en-US" sz="1600" dirty="0">
-                <a:solidFill>
-                  <a:schemeClr val="tx1"/>
-                </a:solidFill>
-                <a:latin typeface="Times New Roman" pitchFamily="18" charset="0"/>
-                <a:cs typeface="Times New Roman" pitchFamily="18" charset="0"/>
-              </a:endParaRPr>
-            </a:p>
-          </p:txBody>
-        </p:sp>
-        <p:sp>
-          <p:nvSpPr>
-            <p:cNvPr id="65" name="矩形 64"/>
-            <p:cNvSpPr/>
-            <p:nvPr/>
-          </p:nvSpPr>
-          <p:spPr>
-            <a:xfrm>
-              <a:off x="4071741" y="4762710"/>
-              <a:ext cx="1296000" cy="315772"/>
-            </a:xfrm>
-            <a:prstGeom prst="rect">
-              <a:avLst/>
-            </a:prstGeom>
-            <a:solidFill>
-              <a:schemeClr val="bg1">
-                <a:lumMod val="95000"/>
-              </a:schemeClr>
-            </a:solidFill>
-            <a:ln w="19050">
-              <a:solidFill>
-                <a:schemeClr val="tx1"/>
-              </a:solidFill>
-            </a:ln>
-          </p:spPr>
-          <p:style>
-            <a:lnRef idx="2">
-              <a:schemeClr val="accent1">
-                <a:shade val="50000"/>
-              </a:schemeClr>
-            </a:lnRef>
-            <a:fillRef idx="1">
-              <a:schemeClr val="accent1"/>
-            </a:fillRef>
-            <a:effectRef idx="0">
-              <a:schemeClr val="accent1"/>
-            </a:effectRef>
-            <a:fontRef idx="minor">
-              <a:schemeClr val="lt1"/>
-            </a:fontRef>
-          </p:style>
-          <p:txBody>
-            <a:bodyPr rtlCol="0" anchor="ctr"/>
-            <a:lstStyle/>
-            <a:p>
-              <a:pPr algn="ctr"/>
-              <a:r>
-                <a:rPr lang="en-US" altLang="zh-CN" sz="1600" dirty="0" smtClean="0">
-                  <a:solidFill>
-                    <a:schemeClr val="tx1"/>
-                  </a:solidFill>
-                  <a:latin typeface="Times New Roman" pitchFamily="18" charset="0"/>
-                  <a:cs typeface="Times New Roman" pitchFamily="18" charset="0"/>
-                </a:rPr>
-                <a:t>[[prototype]]</a:t>
-              </a:r>
-              <a:endParaRPr lang="zh-CN" altLang="en-US" sz="1600" dirty="0">
-                <a:solidFill>
-                  <a:schemeClr val="tx1"/>
-                </a:solidFill>
-                <a:latin typeface="Times New Roman" pitchFamily="18" charset="0"/>
-                <a:cs typeface="Times New Roman" pitchFamily="18" charset="0"/>
-              </a:endParaRPr>
-            </a:p>
-          </p:txBody>
-        </p:sp>
-        <p:sp>
-          <p:nvSpPr>
-            <p:cNvPr id="66" name="矩形 65"/>
-            <p:cNvSpPr/>
-            <p:nvPr/>
-          </p:nvSpPr>
-          <p:spPr>
-            <a:xfrm>
-              <a:off x="5367741" y="4762359"/>
-              <a:ext cx="1296000" cy="315772"/>
-            </a:xfrm>
-            <a:prstGeom prst="rect">
-              <a:avLst/>
-            </a:prstGeom>
-            <a:solidFill>
-              <a:schemeClr val="bg1">
-                <a:lumMod val="95000"/>
-              </a:schemeClr>
-            </a:solidFill>
-            <a:ln w="19050">
-              <a:solidFill>
-                <a:schemeClr val="tx1"/>
-              </a:solidFill>
-            </a:ln>
-          </p:spPr>
-          <p:style>
-            <a:lnRef idx="2">
-              <a:schemeClr val="accent1">
-                <a:shade val="50000"/>
-              </a:schemeClr>
-            </a:lnRef>
-            <a:fillRef idx="1">
-              <a:schemeClr val="accent1"/>
-            </a:fillRef>
-            <a:effectRef idx="0">
-              <a:schemeClr val="accent1"/>
-            </a:effectRef>
-            <a:fontRef idx="minor">
-              <a:schemeClr val="lt1"/>
-            </a:fontRef>
-          </p:style>
-          <p:txBody>
-            <a:bodyPr rtlCol="0" anchor="ctr"/>
-            <a:lstStyle/>
-            <a:p>
-              <a:pPr algn="ctr"/>
-              <a:endParaRPr lang="zh-CN" altLang="en-US" sz="1600" dirty="0">
-                <a:solidFill>
-                  <a:schemeClr val="tx1"/>
-                </a:solidFill>
-                <a:latin typeface="Times New Roman" pitchFamily="18" charset="0"/>
-                <a:cs typeface="Times New Roman" pitchFamily="18" charset="0"/>
-              </a:endParaRPr>
-            </a:p>
-          </p:txBody>
-        </p:sp>
-        <p:sp>
-          <p:nvSpPr>
-            <p:cNvPr id="74" name="矩形 73"/>
-            <p:cNvSpPr/>
-            <p:nvPr/>
-          </p:nvSpPr>
-          <p:spPr>
-            <a:xfrm>
-              <a:off x="4071741" y="5056968"/>
-              <a:ext cx="1296000" cy="315772"/>
-            </a:xfrm>
-            <a:prstGeom prst="rect">
-              <a:avLst/>
-            </a:prstGeom>
-            <a:solidFill>
-              <a:schemeClr val="bg1"/>
-            </a:solidFill>
-            <a:ln w="19050">
-              <a:solidFill>
-                <a:schemeClr val="tx1"/>
-              </a:solidFill>
-            </a:ln>
-          </p:spPr>
-          <p:style>
-            <a:lnRef idx="2">
-              <a:schemeClr val="accent1">
-                <a:shade val="50000"/>
-              </a:schemeClr>
-            </a:lnRef>
-            <a:fillRef idx="1">
-              <a:schemeClr val="accent1"/>
-            </a:fillRef>
-            <a:effectRef idx="0">
-              <a:schemeClr val="accent1"/>
-            </a:effectRef>
-            <a:fontRef idx="minor">
-              <a:schemeClr val="lt1"/>
-            </a:fontRef>
-          </p:style>
-          <p:txBody>
-            <a:bodyPr rtlCol="0" anchor="ctr"/>
-            <a:lstStyle/>
-            <a:p>
-              <a:pPr algn="ctr"/>
-              <a:r>
-                <a:rPr lang="en-US" altLang="zh-CN" sz="1600" dirty="0" err="1" smtClean="0">
-                  <a:solidFill>
-                    <a:schemeClr val="tx1"/>
-                  </a:solidFill>
-                  <a:latin typeface="Times New Roman" pitchFamily="18" charset="0"/>
-                  <a:cs typeface="Times New Roman" pitchFamily="18" charset="0"/>
-                </a:rPr>
-                <a:t>sayName</a:t>
-              </a:r>
-              <a:endParaRPr lang="zh-CN" altLang="en-US" sz="1600" dirty="0">
-                <a:solidFill>
-                  <a:schemeClr val="tx1"/>
-                </a:solidFill>
-                <a:latin typeface="Times New Roman" pitchFamily="18" charset="0"/>
-                <a:cs typeface="Times New Roman" pitchFamily="18" charset="0"/>
-              </a:endParaRPr>
-            </a:p>
-          </p:txBody>
-        </p:sp>
-        <p:sp>
-          <p:nvSpPr>
-            <p:cNvPr id="76" name="矩形 75"/>
-            <p:cNvSpPr/>
-            <p:nvPr/>
-          </p:nvSpPr>
-          <p:spPr>
-            <a:xfrm>
-              <a:off x="5367741" y="5057444"/>
-              <a:ext cx="1296000" cy="315772"/>
-            </a:xfrm>
-            <a:prstGeom prst="rect">
-              <a:avLst/>
-            </a:prstGeom>
-            <a:solidFill>
-              <a:schemeClr val="bg1"/>
-            </a:solidFill>
-            <a:ln w="19050">
-              <a:solidFill>
-                <a:schemeClr val="tx1"/>
-              </a:solidFill>
-            </a:ln>
-          </p:spPr>
-          <p:style>
-            <a:lnRef idx="2">
-              <a:schemeClr val="accent1">
-                <a:shade val="50000"/>
-              </a:schemeClr>
-            </a:lnRef>
-            <a:fillRef idx="1">
-              <a:schemeClr val="accent1"/>
-            </a:fillRef>
-            <a:effectRef idx="0">
-              <a:schemeClr val="accent1"/>
-            </a:effectRef>
-            <a:fontRef idx="minor">
-              <a:schemeClr val="lt1"/>
-            </a:fontRef>
-          </p:style>
-          <p:txBody>
-            <a:bodyPr rtlCol="0" anchor="ctr"/>
-            <a:lstStyle/>
-            <a:p>
-              <a:pPr algn="ctr"/>
-              <a:r>
-                <a:rPr lang="en-US" altLang="zh-CN" sz="1600" dirty="0" smtClean="0">
-                  <a:solidFill>
-                    <a:schemeClr val="tx1"/>
-                  </a:solidFill>
-                  <a:latin typeface="Times New Roman" pitchFamily="18" charset="0"/>
-                  <a:cs typeface="Times New Roman" pitchFamily="18" charset="0"/>
-                </a:rPr>
-                <a:t>(function)</a:t>
-              </a:r>
-              <a:endParaRPr lang="zh-CN" altLang="en-US" sz="1600" dirty="0">
-                <a:solidFill>
-                  <a:schemeClr val="tx1"/>
-                </a:solidFill>
-                <a:latin typeface="Times New Roman" pitchFamily="18" charset="0"/>
-                <a:cs typeface="Times New Roman" pitchFamily="18" charset="0"/>
-              </a:endParaRPr>
-            </a:p>
-          </p:txBody>
-        </p:sp>
-      </p:grpSp>
-      <p:grpSp>
-        <p:nvGrpSpPr>
-          <p:cNvPr id="77" name="组合 76"/>
-          <p:cNvGrpSpPr/>
-          <p:nvPr/>
-        </p:nvGrpSpPr>
-        <p:grpSpPr>
-          <a:xfrm>
-            <a:off x="4071740" y="1053790"/>
-            <a:ext cx="3164555" cy="1582283"/>
-            <a:chOff x="4071741" y="1845878"/>
-            <a:chExt cx="2592000" cy="1582283"/>
-          </a:xfrm>
-        </p:grpSpPr>
+                </a:endParaRPr>
+              </a:p>
+            </p:txBody>
+          </p:sp>
+        </p:grpSp>
         <p:grpSp>
           <p:nvGrpSpPr>
-            <p:cNvPr id="79" name="组合 78"/>
+            <p:cNvPr id="77" name="组合 76"/>
             <p:cNvGrpSpPr/>
             <p:nvPr/>
           </p:nvGrpSpPr>
           <p:grpSpPr>
             <a:xfrm>
-              <a:off x="4071741" y="1845878"/>
-              <a:ext cx="2592000" cy="1581757"/>
+              <a:off x="4071740" y="1053790"/>
+              <a:ext cx="3164555" cy="1582283"/>
               <a:chOff x="4071741" y="1845878"/>
-              <a:chExt cx="2592000" cy="1581757"/>
+              <a:chExt cx="2592000" cy="1582283"/>
             </a:xfrm>
           </p:grpSpPr>
           <p:grpSp>
             <p:nvGrpSpPr>
-              <p:cNvPr id="83" name="组合 82"/>
+              <p:cNvPr id="79" name="组合 78"/>
               <p:cNvGrpSpPr/>
               <p:nvPr/>
             </p:nvGrpSpPr>
@@ -15514,20 +15448,221 @@
               <a:xfrm>
                 <a:off x="4071741" y="1845878"/>
                 <a:ext cx="2592000" cy="1581757"/>
-                <a:chOff x="1115616" y="1484784"/>
-                <a:chExt cx="2448272" cy="1761508"/>
+                <a:chOff x="4071741" y="1845878"/>
+                <a:chExt cx="2592000" cy="1581757"/>
               </a:xfrm>
             </p:grpSpPr>
+            <p:grpSp>
+              <p:nvGrpSpPr>
+                <p:cNvPr id="83" name="组合 82"/>
+                <p:cNvGrpSpPr/>
+                <p:nvPr/>
+              </p:nvGrpSpPr>
+              <p:grpSpPr>
+                <a:xfrm>
+                  <a:off x="4071741" y="1845878"/>
+                  <a:ext cx="2592000" cy="1581757"/>
+                  <a:chOff x="1115616" y="1484784"/>
+                  <a:chExt cx="2448272" cy="1761508"/>
+                </a:xfrm>
+              </p:grpSpPr>
+              <p:sp>
+                <p:nvSpPr>
+                  <p:cNvPr id="87" name="矩形 86"/>
+                  <p:cNvSpPr/>
+                  <p:nvPr/>
+                </p:nvSpPr>
+                <p:spPr>
+                  <a:xfrm>
+                    <a:off x="1115616" y="1484784"/>
+                    <a:ext cx="2448272" cy="1761508"/>
+                  </a:xfrm>
+                  <a:prstGeom prst="rect">
+                    <a:avLst/>
+                  </a:prstGeom>
+                  <a:solidFill>
+                    <a:schemeClr val="bg1">
+                      <a:lumMod val="95000"/>
+                    </a:schemeClr>
+                  </a:solidFill>
+                  <a:ln w="19050">
+                    <a:solidFill>
+                      <a:schemeClr val="tx1"/>
+                    </a:solidFill>
+                  </a:ln>
+                </p:spPr>
+                <p:style>
+                  <a:lnRef idx="2">
+                    <a:schemeClr val="accent1">
+                      <a:shade val="50000"/>
+                    </a:schemeClr>
+                  </a:lnRef>
+                  <a:fillRef idx="1">
+                    <a:schemeClr val="accent1"/>
+                  </a:fillRef>
+                  <a:effectRef idx="0">
+                    <a:schemeClr val="accent1"/>
+                  </a:effectRef>
+                  <a:fontRef idx="minor">
+                    <a:schemeClr val="lt1"/>
+                  </a:fontRef>
+                </p:style>
+                <p:txBody>
+                  <a:bodyPr rtlCol="0" anchor="ctr"/>
+                  <a:lstStyle/>
+                  <a:p>
+                    <a:pPr algn="ctr"/>
+                    <a:endParaRPr lang="zh-CN" altLang="en-US">
+                      <a:latin typeface="Times New Roman" pitchFamily="18" charset="0"/>
+                      <a:cs typeface="Times New Roman" pitchFamily="18" charset="0"/>
+                    </a:endParaRPr>
+                  </a:p>
+                </p:txBody>
+              </p:sp>
+              <p:sp>
+                <p:nvSpPr>
+                  <p:cNvPr id="88" name="矩形 87"/>
+                  <p:cNvSpPr/>
+                  <p:nvPr/>
+                </p:nvSpPr>
+                <p:spPr>
+                  <a:xfrm>
+                    <a:off x="1115616" y="1484784"/>
+                    <a:ext cx="2448272" cy="351656"/>
+                  </a:xfrm>
+                  <a:prstGeom prst="rect">
+                    <a:avLst/>
+                  </a:prstGeom>
+                  <a:solidFill>
+                    <a:schemeClr val="accent5">
+                      <a:lumMod val="40000"/>
+                      <a:lumOff val="60000"/>
+                    </a:schemeClr>
+                  </a:solidFill>
+                  <a:ln w="19050">
+                    <a:solidFill>
+                      <a:schemeClr val="tx1"/>
+                    </a:solidFill>
+                  </a:ln>
+                </p:spPr>
+                <p:style>
+                  <a:lnRef idx="2">
+                    <a:schemeClr val="accent1">
+                      <a:shade val="50000"/>
+                    </a:schemeClr>
+                  </a:lnRef>
+                  <a:fillRef idx="1">
+                    <a:schemeClr val="accent1"/>
+                  </a:fillRef>
+                  <a:effectRef idx="0">
+                    <a:schemeClr val="accent1"/>
+                  </a:effectRef>
+                  <a:fontRef idx="minor">
+                    <a:schemeClr val="lt1"/>
+                  </a:fontRef>
+                </p:style>
+                <p:txBody>
+                  <a:bodyPr rtlCol="0" anchor="ctr"/>
+                  <a:lstStyle/>
+                  <a:p>
+                    <a:pPr algn="ctr"/>
+                    <a:r>
+                      <a:rPr lang="en-US" altLang="zh-CN" dirty="0" smtClean="0">
+                        <a:solidFill>
+                          <a:schemeClr val="tx1"/>
+                        </a:solidFill>
+                        <a:latin typeface="Times New Roman" pitchFamily="18" charset="0"/>
+                        <a:cs typeface="Times New Roman" pitchFamily="18" charset="0"/>
+                      </a:rPr>
+                      <a:t>Object Prototype</a:t>
+                    </a:r>
+                    <a:endParaRPr lang="zh-CN" altLang="en-US" dirty="0">
+                      <a:solidFill>
+                        <a:schemeClr val="tx1"/>
+                      </a:solidFill>
+                      <a:latin typeface="Times New Roman" pitchFamily="18" charset="0"/>
+                      <a:cs typeface="Times New Roman" pitchFamily="18" charset="0"/>
+                    </a:endParaRPr>
+                  </a:p>
+                </p:txBody>
+              </p:sp>
+              <p:sp>
+                <p:nvSpPr>
+                  <p:cNvPr id="89" name="矩形 88"/>
+                  <p:cNvSpPr/>
+                  <p:nvPr/>
+                </p:nvSpPr>
+                <p:spPr>
+                  <a:xfrm>
+                    <a:off x="1115617" y="1836440"/>
+                    <a:ext cx="1224136" cy="351656"/>
+                  </a:xfrm>
+                  <a:prstGeom prst="rect">
+                    <a:avLst/>
+                  </a:prstGeom>
+                  <a:solidFill>
+                    <a:schemeClr val="bg1">
+                      <a:lumMod val="95000"/>
+                    </a:schemeClr>
+                  </a:solidFill>
+                  <a:ln w="19050">
+                    <a:solidFill>
+                      <a:schemeClr val="tx1"/>
+                    </a:solidFill>
+                  </a:ln>
+                </p:spPr>
+                <p:style>
+                  <a:lnRef idx="2">
+                    <a:schemeClr val="accent1">
+                      <a:shade val="50000"/>
+                    </a:schemeClr>
+                  </a:lnRef>
+                  <a:fillRef idx="1">
+                    <a:schemeClr val="accent1"/>
+                  </a:fillRef>
+                  <a:effectRef idx="0">
+                    <a:schemeClr val="accent1"/>
+                  </a:effectRef>
+                  <a:fontRef idx="minor">
+                    <a:schemeClr val="lt1"/>
+                  </a:fontRef>
+                </p:style>
+                <p:txBody>
+                  <a:bodyPr rtlCol="0" anchor="ctr"/>
+                  <a:lstStyle/>
+                  <a:p>
+                    <a:pPr algn="ctr"/>
+                    <a:r>
+                      <a:rPr lang="en-US" altLang="zh-CN" sz="1600" dirty="0" smtClean="0">
+                        <a:solidFill>
+                          <a:schemeClr val="tx1"/>
+                        </a:solidFill>
+                        <a:latin typeface="Times New Roman" pitchFamily="18" charset="0"/>
+                        <a:cs typeface="Times New Roman" pitchFamily="18" charset="0"/>
+                      </a:rPr>
+                      <a:t>constructor</a:t>
+                    </a:r>
+                    <a:endParaRPr lang="zh-CN" altLang="en-US" sz="1600" dirty="0">
+                      <a:solidFill>
+                        <a:schemeClr val="tx1"/>
+                      </a:solidFill>
+                      <a:latin typeface="Times New Roman" pitchFamily="18" charset="0"/>
+                      <a:cs typeface="Times New Roman" pitchFamily="18" charset="0"/>
+                    </a:endParaRPr>
+                  </a:p>
+                </p:txBody>
+              </p:sp>
+            </p:grpSp>
             <p:sp>
               <p:nvSpPr>
-                <p:cNvPr id="87" name="矩形 86"/>
+                <p:cNvPr id="84" name="矩形 83"/>
                 <p:cNvSpPr/>
                 <p:nvPr/>
               </p:nvSpPr>
               <p:spPr>
                 <a:xfrm>
-                  <a:off x="1115616" y="1484784"/>
-                  <a:ext cx="2448272" cy="1761508"/>
+                  <a:off x="4071741" y="2477422"/>
+                  <a:ext cx="1296000" cy="318143"/>
                 </a:xfrm>
                 <a:prstGeom prst="rect">
                   <a:avLst/>
@@ -15535,60 +15670,6 @@
                 <a:solidFill>
                   <a:schemeClr val="bg1">
                     <a:lumMod val="95000"/>
-                  </a:schemeClr>
-                </a:solidFill>
-                <a:ln w="19050">
-                  <a:solidFill>
-                    <a:schemeClr val="tx1"/>
-                  </a:solidFill>
-                </a:ln>
-              </p:spPr>
-              <p:style>
-                <a:lnRef idx="2">
-                  <a:schemeClr val="accent1">
-                    <a:shade val="50000"/>
-                  </a:schemeClr>
-                </a:lnRef>
-                <a:fillRef idx="1">
-                  <a:schemeClr val="accent1"/>
-                </a:fillRef>
-                <a:effectRef idx="0">
-                  <a:schemeClr val="accent1"/>
-                </a:effectRef>
-                <a:fontRef idx="minor">
-                  <a:schemeClr val="lt1"/>
-                </a:fontRef>
-              </p:style>
-              <p:txBody>
-                <a:bodyPr rtlCol="0" anchor="ctr"/>
-                <a:lstStyle/>
-                <a:p>
-                  <a:pPr algn="ctr"/>
-                  <a:endParaRPr lang="zh-CN" altLang="en-US">
-                    <a:latin typeface="Times New Roman" pitchFamily="18" charset="0"/>
-                    <a:cs typeface="Times New Roman" pitchFamily="18" charset="0"/>
-                  </a:endParaRPr>
-                </a:p>
-              </p:txBody>
-            </p:sp>
-            <p:sp>
-              <p:nvSpPr>
-                <p:cNvPr id="88" name="矩形 87"/>
-                <p:cNvSpPr/>
-                <p:nvPr/>
-              </p:nvSpPr>
-              <p:spPr>
-                <a:xfrm>
-                  <a:off x="1115616" y="1484784"/>
-                  <a:ext cx="2448272" cy="351656"/>
-                </a:xfrm>
-                <a:prstGeom prst="rect">
-                  <a:avLst/>
-                </a:prstGeom>
-                <a:solidFill>
-                  <a:schemeClr val="accent5">
-                    <a:lumMod val="40000"/>
-                    <a:lumOff val="60000"/>
                   </a:schemeClr>
                 </a:solidFill>
                 <a:ln w="19050">
@@ -15619,16 +15700,16 @@
                 <a:p>
                   <a:pPr algn="ctr"/>
                   <a:r>
-                    <a:rPr lang="en-US" altLang="zh-CN" dirty="0" smtClean="0">
+                    <a:rPr lang="en-US" altLang="zh-CN" sz="1600" dirty="0" err="1" smtClean="0">
                       <a:solidFill>
                         <a:schemeClr val="tx1"/>
                       </a:solidFill>
                       <a:latin typeface="Times New Roman" pitchFamily="18" charset="0"/>
                       <a:cs typeface="Times New Roman" pitchFamily="18" charset="0"/>
                     </a:rPr>
-                    <a:t>Object Prototype</a:t>
+                    <a:t>hasOwnProperty</a:t>
                   </a:r>
-                  <a:endParaRPr lang="zh-CN" altLang="en-US" dirty="0">
+                  <a:endParaRPr lang="zh-CN" altLang="en-US" sz="1600" dirty="0">
                     <a:solidFill>
                       <a:schemeClr val="tx1"/>
                     </a:solidFill>
@@ -15640,14 +15721,14 @@
             </p:sp>
             <p:sp>
               <p:nvSpPr>
-                <p:cNvPr id="89" name="矩形 88"/>
+                <p:cNvPr id="85" name="矩形 84"/>
                 <p:cNvSpPr/>
                 <p:nvPr/>
               </p:nvSpPr>
               <p:spPr>
                 <a:xfrm>
-                  <a:off x="1115617" y="1836440"/>
-                  <a:ext cx="1224136" cy="351656"/>
+                  <a:off x="4071741" y="2795828"/>
+                  <a:ext cx="1296000" cy="315772"/>
                 </a:xfrm>
                 <a:prstGeom prst="rect">
                   <a:avLst/>
@@ -15685,14 +15766,80 @@
                 <a:p>
                   <a:pPr algn="ctr"/>
                   <a:r>
-                    <a:rPr lang="en-US" altLang="zh-CN" sz="1600" dirty="0" smtClean="0">
+                    <a:rPr lang="en-US" altLang="zh-CN" sz="1600" dirty="0" err="1" smtClean="0">
                       <a:solidFill>
                         <a:schemeClr val="tx1"/>
                       </a:solidFill>
                       <a:latin typeface="Times New Roman" pitchFamily="18" charset="0"/>
                       <a:cs typeface="Times New Roman" pitchFamily="18" charset="0"/>
                     </a:rPr>
-                    <a:t>constructor</a:t>
+                    <a:t>isPrototypeOf</a:t>
+                  </a:r>
+                  <a:endParaRPr lang="zh-CN" altLang="en-US" sz="1600" dirty="0">
+                    <a:solidFill>
+                      <a:schemeClr val="tx1"/>
+                    </a:solidFill>
+                    <a:latin typeface="Times New Roman" pitchFamily="18" charset="0"/>
+                    <a:cs typeface="Times New Roman" pitchFamily="18" charset="0"/>
+                  </a:endParaRPr>
+                </a:p>
+              </p:txBody>
+            </p:sp>
+            <p:sp>
+              <p:nvSpPr>
+                <p:cNvPr id="86" name="矩形 85"/>
+                <p:cNvSpPr/>
+                <p:nvPr/>
+              </p:nvSpPr>
+              <p:spPr>
+                <a:xfrm>
+                  <a:off x="4071741" y="3111863"/>
+                  <a:ext cx="1296000" cy="315772"/>
+                </a:xfrm>
+                <a:prstGeom prst="rect">
+                  <a:avLst/>
+                </a:prstGeom>
+                <a:solidFill>
+                  <a:schemeClr val="bg1">
+                    <a:lumMod val="95000"/>
+                  </a:schemeClr>
+                </a:solidFill>
+                <a:ln w="19050">
+                  <a:solidFill>
+                    <a:schemeClr val="tx1"/>
+                  </a:solidFill>
+                </a:ln>
+              </p:spPr>
+              <p:style>
+                <a:lnRef idx="2">
+                  <a:schemeClr val="accent1">
+                    <a:shade val="50000"/>
+                  </a:schemeClr>
+                </a:lnRef>
+                <a:fillRef idx="1">
+                  <a:schemeClr val="accent1"/>
+                </a:fillRef>
+                <a:effectRef idx="0">
+                  <a:schemeClr val="accent1"/>
+                </a:effectRef>
+                <a:fontRef idx="minor">
+                  <a:schemeClr val="lt1"/>
+                </a:fontRef>
+              </p:style>
+              <p:txBody>
+                <a:bodyPr rtlCol="0" anchor="ctr"/>
+                <a:lstStyle/>
+                <a:p>
+                  <a:pPr algn="ctr"/>
+                  <a:r>
+                    <a:rPr lang="en-US" altLang="zh-CN" sz="1600" dirty="0" err="1" smtClean="0">
+                      <a:solidFill>
+                        <a:schemeClr val="tx1"/>
+                      </a:solidFill>
+                      <a:latin typeface="Times New Roman" pitchFamily="18" charset="0"/>
+                      <a:cs typeface="Times New Roman" pitchFamily="18" charset="0"/>
+                    </a:rPr>
+                    <a:t>toString</a:t>
                   </a:r>
                   <a:endParaRPr lang="zh-CN" altLang="en-US" sz="1600" dirty="0">
                     <a:solidFill>
@@ -15707,14 +15854,14 @@
           </p:grpSp>
           <p:sp>
             <p:nvSpPr>
-              <p:cNvPr id="84" name="矩形 83"/>
+              <p:cNvPr id="80" name="矩形 79"/>
               <p:cNvSpPr/>
               <p:nvPr/>
             </p:nvSpPr>
             <p:spPr>
               <a:xfrm>
-                <a:off x="4071741" y="2477422"/>
-                <a:ext cx="1296000" cy="318143"/>
+                <a:off x="5367741" y="2480319"/>
+                <a:ext cx="1296000" cy="315772"/>
               </a:xfrm>
               <a:prstGeom prst="rect">
                 <a:avLst/>
@@ -15752,14 +15899,14 @@
               <a:p>
                 <a:pPr algn="ctr"/>
                 <a:r>
-                  <a:rPr lang="en-US" altLang="zh-CN" sz="1600" dirty="0" err="1" smtClean="0">
+                  <a:rPr lang="en-US" altLang="zh-CN" sz="1600" dirty="0" smtClean="0">
                     <a:solidFill>
                       <a:schemeClr val="tx1"/>
                     </a:solidFill>
                     <a:latin typeface="Times New Roman" pitchFamily="18" charset="0"/>
                     <a:cs typeface="Times New Roman" pitchFamily="18" charset="0"/>
                   </a:rPr>
-                  <a:t>hasOwnProperty</a:t>
+                  <a:t>(function)</a:t>
                 </a:r>
                 <a:endParaRPr lang="zh-CN" altLang="en-US" sz="1600" dirty="0">
                   <a:solidFill>
@@ -15773,13 +15920,13 @@
           </p:sp>
           <p:sp>
             <p:nvSpPr>
-              <p:cNvPr id="85" name="矩形 84"/>
+              <p:cNvPr id="81" name="矩形 80"/>
               <p:cNvSpPr/>
               <p:nvPr/>
             </p:nvSpPr>
             <p:spPr>
               <a:xfrm>
-                <a:off x="4071741" y="2795828"/>
+                <a:off x="5367741" y="2796354"/>
                 <a:ext cx="1296000" cy="315772"/>
               </a:xfrm>
               <a:prstGeom prst="rect">
@@ -15818,14 +15965,14 @@
               <a:p>
                 <a:pPr algn="ctr"/>
                 <a:r>
-                  <a:rPr lang="en-US" altLang="zh-CN" sz="1600" dirty="0" err="1" smtClean="0">
+                  <a:rPr lang="en-US" altLang="zh-CN" sz="1600" dirty="0">
                     <a:solidFill>
                       <a:schemeClr val="tx1"/>
                     </a:solidFill>
                     <a:latin typeface="Times New Roman" pitchFamily="18" charset="0"/>
                     <a:cs typeface="Times New Roman" pitchFamily="18" charset="0"/>
                   </a:rPr>
-                  <a:t>isPrototypeOf</a:t>
+                  <a:t>(function)</a:t>
                 </a:r>
                 <a:endParaRPr lang="zh-CN" altLang="en-US" sz="1600" dirty="0">
                   <a:solidFill>
@@ -15839,13 +15986,13 @@
           </p:sp>
           <p:sp>
             <p:nvSpPr>
-              <p:cNvPr id="86" name="矩形 85"/>
+              <p:cNvPr id="82" name="矩形 81"/>
               <p:cNvSpPr/>
               <p:nvPr/>
             </p:nvSpPr>
             <p:spPr>
               <a:xfrm>
-                <a:off x="4071741" y="3111863"/>
+                <a:off x="5367741" y="3112389"/>
                 <a:ext cx="1296000" cy="315772"/>
               </a:xfrm>
               <a:prstGeom prst="rect">
@@ -15884,14 +16031,14 @@
               <a:p>
                 <a:pPr algn="ctr"/>
                 <a:r>
-                  <a:rPr lang="en-US" altLang="zh-CN" sz="1600" dirty="0" err="1" smtClean="0">
+                  <a:rPr lang="en-US" altLang="zh-CN" sz="1600" dirty="0">
                     <a:solidFill>
                       <a:schemeClr val="tx1"/>
                     </a:solidFill>
                     <a:latin typeface="Times New Roman" pitchFamily="18" charset="0"/>
                     <a:cs typeface="Times New Roman" pitchFamily="18" charset="0"/>
                   </a:rPr>
-                  <a:t>toString</a:t>
+                  <a:t>(function)</a:t>
                 </a:r>
                 <a:endParaRPr lang="zh-CN" altLang="en-US" sz="1600" dirty="0">
                   <a:solidFill>
@@ -15904,893 +16051,653 @@
             </p:txBody>
           </p:sp>
         </p:grpSp>
-        <p:sp>
-          <p:nvSpPr>
-            <p:cNvPr id="80" name="矩形 79"/>
-            <p:cNvSpPr/>
+        <p:cxnSp>
+          <p:nvCxnSpPr>
+            <p:cNvPr id="78" name="肘形连接符 77"/>
+            <p:cNvCxnSpPr>
+              <a:endCxn id="95" idx="0"/>
+            </p:cNvCxnSpPr>
             <p:nvPr/>
-          </p:nvSpPr>
+          </p:nvCxnSpPr>
           <p:spPr>
-            <a:xfrm>
-              <a:off x="5367741" y="2480319"/>
-              <a:ext cx="1296000" cy="315772"/>
+            <a:xfrm rot="10800000">
+              <a:off x="1907560" y="1052736"/>
+              <a:ext cx="4563176" cy="474712"/>
             </a:xfrm>
-            <a:prstGeom prst="rect">
-              <a:avLst/>
+            <a:prstGeom prst="bentConnector4">
+              <a:avLst>
+                <a:gd name="adj1" fmla="val -26571"/>
+                <a:gd name="adj2" fmla="val 148156"/>
+              </a:avLst>
             </a:prstGeom>
-            <a:solidFill>
-              <a:schemeClr val="bg1">
-                <a:lumMod val="95000"/>
-              </a:schemeClr>
-            </a:solidFill>
             <a:ln w="19050">
               <a:solidFill>
                 <a:schemeClr val="tx1"/>
               </a:solidFill>
+              <a:headEnd type="oval" w="med" len="med"/>
+              <a:tailEnd type="triangle" w="lg" len="med"/>
             </a:ln>
           </p:spPr>
           <p:style>
-            <a:lnRef idx="2">
-              <a:schemeClr val="accent1">
-                <a:shade val="50000"/>
-              </a:schemeClr>
+            <a:lnRef idx="1">
+              <a:schemeClr val="accent1"/>
             </a:lnRef>
-            <a:fillRef idx="1">
+            <a:fillRef idx="0">
               <a:schemeClr val="accent1"/>
             </a:fillRef>
             <a:effectRef idx="0">
               <a:schemeClr val="accent1"/>
             </a:effectRef>
             <a:fontRef idx="minor">
-              <a:schemeClr val="lt1"/>
+              <a:schemeClr val="tx1"/>
             </a:fontRef>
           </p:style>
-          <p:txBody>
-            <a:bodyPr rtlCol="0" anchor="ctr"/>
-            <a:lstStyle/>
-            <a:p>
-              <a:pPr algn="ctr"/>
-              <a:r>
-                <a:rPr lang="en-US" altLang="zh-CN" sz="1600" dirty="0" smtClean="0">
+        </p:cxnSp>
+        <p:grpSp>
+          <p:nvGrpSpPr>
+            <p:cNvPr id="103" name="组合 102"/>
+            <p:cNvGrpSpPr/>
+            <p:nvPr/>
+          </p:nvGrpSpPr>
+          <p:grpSpPr>
+            <a:xfrm>
+              <a:off x="4072287" y="3212976"/>
+              <a:ext cx="2592000" cy="949660"/>
+              <a:chOff x="4071741" y="4135760"/>
+              <a:chExt cx="2592000" cy="949660"/>
+            </a:xfrm>
+          </p:grpSpPr>
+          <p:sp>
+            <p:nvSpPr>
+              <p:cNvPr id="104" name="矩形 103"/>
+              <p:cNvSpPr/>
+              <p:nvPr/>
+            </p:nvSpPr>
+            <p:spPr>
+              <a:xfrm>
+                <a:off x="4071741" y="4135760"/>
+                <a:ext cx="2592000" cy="949660"/>
+              </a:xfrm>
+              <a:prstGeom prst="rect">
+                <a:avLst/>
+              </a:prstGeom>
+              <a:solidFill>
+                <a:schemeClr val="bg1">
+                  <a:lumMod val="95000"/>
+                </a:schemeClr>
+              </a:solidFill>
+              <a:ln w="19050">
+                <a:solidFill>
+                  <a:schemeClr val="tx1"/>
+                </a:solidFill>
+              </a:ln>
+            </p:spPr>
+            <p:style>
+              <a:lnRef idx="2">
+                <a:schemeClr val="accent1">
+                  <a:shade val="50000"/>
+                </a:schemeClr>
+              </a:lnRef>
+              <a:fillRef idx="1">
+                <a:schemeClr val="accent1"/>
+              </a:fillRef>
+              <a:effectRef idx="0">
+                <a:schemeClr val="accent1"/>
+              </a:effectRef>
+              <a:fontRef idx="minor">
+                <a:schemeClr val="lt1"/>
+              </a:fontRef>
+            </p:style>
+            <p:txBody>
+              <a:bodyPr rtlCol="0" anchor="ctr"/>
+              <a:lstStyle/>
+              <a:p>
+                <a:pPr algn="ctr"/>
+                <a:endParaRPr lang="zh-CN" altLang="en-US">
+                  <a:latin typeface="Times New Roman" pitchFamily="18" charset="0"/>
+                  <a:cs typeface="Times New Roman" pitchFamily="18" charset="0"/>
+                </a:endParaRPr>
+              </a:p>
+            </p:txBody>
+          </p:sp>
+          <p:sp>
+            <p:nvSpPr>
+              <p:cNvPr id="105" name="矩形 104"/>
+              <p:cNvSpPr/>
+              <p:nvPr/>
+            </p:nvSpPr>
+            <p:spPr>
+              <a:xfrm>
+                <a:off x="4071741" y="4135760"/>
+                <a:ext cx="2592000" cy="315772"/>
+              </a:xfrm>
+              <a:prstGeom prst="rect">
+                <a:avLst/>
+              </a:prstGeom>
+              <a:solidFill>
+                <a:schemeClr val="accent5">
+                  <a:lumMod val="40000"/>
+                  <a:lumOff val="60000"/>
+                </a:schemeClr>
+              </a:solidFill>
+              <a:ln w="19050">
+                <a:solidFill>
+                  <a:schemeClr val="tx1"/>
+                </a:solidFill>
+              </a:ln>
+            </p:spPr>
+            <p:style>
+              <a:lnRef idx="2">
+                <a:schemeClr val="accent1">
+                  <a:shade val="50000"/>
+                </a:schemeClr>
+              </a:lnRef>
+              <a:fillRef idx="1">
+                <a:schemeClr val="accent1"/>
+              </a:fillRef>
+              <a:effectRef idx="0">
+                <a:schemeClr val="accent1"/>
+              </a:effectRef>
+              <a:fontRef idx="minor">
+                <a:schemeClr val="lt1"/>
+              </a:fontRef>
+            </p:style>
+            <p:txBody>
+              <a:bodyPr rtlCol="0" anchor="ctr"/>
+              <a:lstStyle/>
+              <a:p>
+                <a:pPr algn="ctr"/>
+                <a:r>
+                  <a:rPr lang="zh-CN" altLang="en-US" dirty="0" smtClean="0">
+                    <a:solidFill>
+                      <a:schemeClr val="tx1"/>
+                    </a:solidFill>
+                    <a:latin typeface="Times New Roman" pitchFamily="18" charset="0"/>
+                    <a:cs typeface="Times New Roman" pitchFamily="18" charset="0"/>
+                  </a:rPr>
+                  <a:t>默认的</a:t>
+                </a:r>
+                <a:r>
+                  <a:rPr lang="en-US" altLang="zh-CN" dirty="0" smtClean="0">
+                    <a:solidFill>
+                      <a:schemeClr val="tx1"/>
+                    </a:solidFill>
+                    <a:latin typeface="Times New Roman" pitchFamily="18" charset="0"/>
+                    <a:cs typeface="Times New Roman" pitchFamily="18" charset="0"/>
+                  </a:rPr>
+                  <a:t>Person Prototype</a:t>
+                </a:r>
+                <a:endParaRPr lang="zh-CN" altLang="en-US" dirty="0">
                   <a:solidFill>
                     <a:schemeClr val="tx1"/>
                   </a:solidFill>
                   <a:latin typeface="Times New Roman" pitchFamily="18" charset="0"/>
                   <a:cs typeface="Times New Roman" pitchFamily="18" charset="0"/>
-                </a:rPr>
-                <a:t>(function)</a:t>
-              </a:r>
-              <a:endParaRPr lang="zh-CN" altLang="en-US" sz="1600" dirty="0">
+                </a:endParaRPr>
+              </a:p>
+            </p:txBody>
+          </p:sp>
+          <p:sp>
+            <p:nvSpPr>
+              <p:cNvPr id="106" name="矩形 105"/>
+              <p:cNvSpPr/>
+              <p:nvPr/>
+            </p:nvSpPr>
+            <p:spPr>
+              <a:xfrm>
+                <a:off x="4071741" y="4451531"/>
+                <a:ext cx="1296000" cy="310827"/>
+              </a:xfrm>
+              <a:prstGeom prst="rect">
+                <a:avLst/>
+              </a:prstGeom>
+              <a:solidFill>
+                <a:schemeClr val="bg1">
+                  <a:lumMod val="95000"/>
+                </a:schemeClr>
+              </a:solidFill>
+              <a:ln w="19050">
                 <a:solidFill>
                   <a:schemeClr val="tx1"/>
                 </a:solidFill>
-                <a:latin typeface="Times New Roman" pitchFamily="18" charset="0"/>
-                <a:cs typeface="Times New Roman" pitchFamily="18" charset="0"/>
-              </a:endParaRPr>
-            </a:p>
-          </p:txBody>
-        </p:sp>
-        <p:sp>
-          <p:nvSpPr>
-            <p:cNvPr id="81" name="矩形 80"/>
-            <p:cNvSpPr/>
+              </a:ln>
+            </p:spPr>
+            <p:style>
+              <a:lnRef idx="2">
+                <a:schemeClr val="accent1">
+                  <a:shade val="50000"/>
+                </a:schemeClr>
+              </a:lnRef>
+              <a:fillRef idx="1">
+                <a:schemeClr val="accent1"/>
+              </a:fillRef>
+              <a:effectRef idx="0">
+                <a:schemeClr val="accent1"/>
+              </a:effectRef>
+              <a:fontRef idx="minor">
+                <a:schemeClr val="lt1"/>
+              </a:fontRef>
+            </p:style>
+            <p:txBody>
+              <a:bodyPr rtlCol="0" anchor="ctr"/>
+              <a:lstStyle/>
+              <a:p>
+                <a:pPr algn="ctr"/>
+                <a:r>
+                  <a:rPr lang="en-US" altLang="zh-CN" sz="1600" dirty="0" smtClean="0">
+                    <a:solidFill>
+                      <a:schemeClr val="tx1"/>
+                    </a:solidFill>
+                    <a:latin typeface="Times New Roman" pitchFamily="18" charset="0"/>
+                    <a:cs typeface="Times New Roman" pitchFamily="18" charset="0"/>
+                  </a:rPr>
+                  <a:t>constructor</a:t>
+                </a:r>
+                <a:endParaRPr lang="zh-CN" altLang="en-US" sz="1600" dirty="0">
+                  <a:solidFill>
+                    <a:schemeClr val="tx1"/>
+                  </a:solidFill>
+                  <a:latin typeface="Times New Roman" pitchFamily="18" charset="0"/>
+                  <a:cs typeface="Times New Roman" pitchFamily="18" charset="0"/>
+                </a:endParaRPr>
+              </a:p>
+            </p:txBody>
+          </p:sp>
+          <p:sp>
+            <p:nvSpPr>
+              <p:cNvPr id="107" name="矩形 106"/>
+              <p:cNvSpPr/>
+              <p:nvPr/>
+            </p:nvSpPr>
+            <p:spPr>
+              <a:xfrm>
+                <a:off x="4071741" y="4762710"/>
+                <a:ext cx="1296000" cy="315772"/>
+              </a:xfrm>
+              <a:prstGeom prst="rect">
+                <a:avLst/>
+              </a:prstGeom>
+              <a:solidFill>
+                <a:schemeClr val="bg1">
+                  <a:lumMod val="95000"/>
+                </a:schemeClr>
+              </a:solidFill>
+              <a:ln w="19050">
+                <a:solidFill>
+                  <a:schemeClr val="tx1"/>
+                </a:solidFill>
+              </a:ln>
+            </p:spPr>
+            <p:style>
+              <a:lnRef idx="2">
+                <a:schemeClr val="accent1">
+                  <a:shade val="50000"/>
+                </a:schemeClr>
+              </a:lnRef>
+              <a:fillRef idx="1">
+                <a:schemeClr val="accent1"/>
+              </a:fillRef>
+              <a:effectRef idx="0">
+                <a:schemeClr val="accent1"/>
+              </a:effectRef>
+              <a:fontRef idx="minor">
+                <a:schemeClr val="lt1"/>
+              </a:fontRef>
+            </p:style>
+            <p:txBody>
+              <a:bodyPr rtlCol="0" anchor="ctr"/>
+              <a:lstStyle/>
+              <a:p>
+                <a:pPr algn="ctr"/>
+                <a:r>
+                  <a:rPr lang="en-US" altLang="zh-CN" sz="1600" dirty="0" smtClean="0">
+                    <a:solidFill>
+                      <a:schemeClr val="tx1"/>
+                    </a:solidFill>
+                    <a:latin typeface="Times New Roman" pitchFamily="18" charset="0"/>
+                    <a:cs typeface="Times New Roman" pitchFamily="18" charset="0"/>
+                  </a:rPr>
+                  <a:t>[[prototype]]</a:t>
+                </a:r>
+                <a:endParaRPr lang="zh-CN" altLang="en-US" sz="1600" dirty="0">
+                  <a:solidFill>
+                    <a:schemeClr val="tx1"/>
+                  </a:solidFill>
+                  <a:latin typeface="Times New Roman" pitchFamily="18" charset="0"/>
+                  <a:cs typeface="Times New Roman" pitchFamily="18" charset="0"/>
+                </a:endParaRPr>
+              </a:p>
+            </p:txBody>
+          </p:sp>
+          <p:sp>
+            <p:nvSpPr>
+              <p:cNvPr id="108" name="矩形 107"/>
+              <p:cNvSpPr/>
+              <p:nvPr/>
+            </p:nvSpPr>
+            <p:spPr>
+              <a:xfrm>
+                <a:off x="5367741" y="4762359"/>
+                <a:ext cx="1296000" cy="315772"/>
+              </a:xfrm>
+              <a:prstGeom prst="rect">
+                <a:avLst/>
+              </a:prstGeom>
+              <a:solidFill>
+                <a:schemeClr val="bg1">
+                  <a:lumMod val="95000"/>
+                </a:schemeClr>
+              </a:solidFill>
+              <a:ln w="19050">
+                <a:solidFill>
+                  <a:schemeClr val="tx1"/>
+                </a:solidFill>
+              </a:ln>
+            </p:spPr>
+            <p:style>
+              <a:lnRef idx="2">
+                <a:schemeClr val="accent1">
+                  <a:shade val="50000"/>
+                </a:schemeClr>
+              </a:lnRef>
+              <a:fillRef idx="1">
+                <a:schemeClr val="accent1"/>
+              </a:fillRef>
+              <a:effectRef idx="0">
+                <a:schemeClr val="accent1"/>
+              </a:effectRef>
+              <a:fontRef idx="minor">
+                <a:schemeClr val="lt1"/>
+              </a:fontRef>
+            </p:style>
+            <p:txBody>
+              <a:bodyPr rtlCol="0" anchor="ctr"/>
+              <a:lstStyle/>
+              <a:p>
+                <a:pPr algn="ctr"/>
+                <a:endParaRPr lang="zh-CN" altLang="en-US" sz="1600" dirty="0">
+                  <a:solidFill>
+                    <a:schemeClr val="tx1"/>
+                  </a:solidFill>
+                  <a:latin typeface="Times New Roman" pitchFamily="18" charset="0"/>
+                  <a:cs typeface="Times New Roman" pitchFamily="18" charset="0"/>
+                </a:endParaRPr>
+              </a:p>
+            </p:txBody>
+          </p:sp>
+        </p:grpSp>
+        <p:cxnSp>
+          <p:nvCxnSpPr>
+            <p:cNvPr id="68" name="肘形连接符 67"/>
+            <p:cNvCxnSpPr/>
             <p:nvPr/>
-          </p:nvSpPr>
+          </p:nvCxnSpPr>
           <p:spPr>
-            <a:xfrm>
-              <a:off x="5367741" y="2796354"/>
-              <a:ext cx="1296000" cy="315772"/>
+            <a:xfrm flipV="1">
+              <a:off x="6015740" y="2924945"/>
+              <a:ext cx="1455483" cy="1072516"/>
             </a:xfrm>
-            <a:prstGeom prst="rect">
-              <a:avLst/>
+            <a:prstGeom prst="bentConnector3">
+              <a:avLst>
+                <a:gd name="adj1" fmla="val 99474"/>
+              </a:avLst>
             </a:prstGeom>
-            <a:solidFill>
-              <a:schemeClr val="bg1">
-                <a:lumMod val="95000"/>
-              </a:schemeClr>
-            </a:solidFill>
-            <a:ln w="19050">
+            <a:ln w="28575">
               <a:solidFill>
-                <a:schemeClr val="tx1"/>
+                <a:srgbClr val="FF0000"/>
               </a:solidFill>
+              <a:prstDash val="solid"/>
+              <a:headEnd type="oval" w="med" len="med"/>
+              <a:tailEnd type="none" w="med" len="med"/>
             </a:ln>
           </p:spPr>
           <p:style>
-            <a:lnRef idx="2">
-              <a:schemeClr val="accent1">
-                <a:shade val="50000"/>
-              </a:schemeClr>
+            <a:lnRef idx="1">
+              <a:schemeClr val="accent1"/>
             </a:lnRef>
-            <a:fillRef idx="1">
+            <a:fillRef idx="0">
               <a:schemeClr val="accent1"/>
             </a:fillRef>
             <a:effectRef idx="0">
               <a:schemeClr val="accent1"/>
             </a:effectRef>
             <a:fontRef idx="minor">
-              <a:schemeClr val="lt1"/>
+              <a:schemeClr val="tx1"/>
             </a:fontRef>
           </p:style>
-          <p:txBody>
-            <a:bodyPr rtlCol="0" anchor="ctr"/>
-            <a:lstStyle/>
-            <a:p>
-              <a:pPr algn="ctr"/>
-              <a:r>
-                <a:rPr lang="en-US" altLang="zh-CN" sz="1600" dirty="0">
-                  <a:solidFill>
-                    <a:schemeClr val="tx1"/>
-                  </a:solidFill>
-                  <a:latin typeface="Times New Roman" pitchFamily="18" charset="0"/>
-                  <a:cs typeface="Times New Roman" pitchFamily="18" charset="0"/>
-                </a:rPr>
-                <a:t>(function)</a:t>
-              </a:r>
-              <a:endParaRPr lang="zh-CN" altLang="en-US" sz="1600" dirty="0">
-                <a:solidFill>
-                  <a:schemeClr val="tx1"/>
-                </a:solidFill>
-                <a:latin typeface="Times New Roman" pitchFamily="18" charset="0"/>
-                <a:cs typeface="Times New Roman" pitchFamily="18" charset="0"/>
-              </a:endParaRPr>
-            </a:p>
-          </p:txBody>
-        </p:sp>
-        <p:sp>
-          <p:nvSpPr>
-            <p:cNvPr id="82" name="矩形 81"/>
-            <p:cNvSpPr/>
+        </p:cxnSp>
+        <p:cxnSp>
+          <p:nvCxnSpPr>
+            <p:cNvPr id="11" name="直接连接符 10"/>
+            <p:cNvCxnSpPr/>
             <p:nvPr/>
-          </p:nvSpPr>
+          </p:nvCxnSpPr>
           <p:spPr>
             <a:xfrm>
-              <a:off x="5367741" y="3112389"/>
-              <a:ext cx="1296000" cy="315772"/>
+              <a:off x="3555216" y="2924944"/>
+              <a:ext cx="3916004" cy="0"/>
             </a:xfrm>
-            <a:prstGeom prst="rect">
+            <a:prstGeom prst="line">
               <a:avLst/>
             </a:prstGeom>
-            <a:solidFill>
-              <a:schemeClr val="bg1">
-                <a:lumMod val="95000"/>
-              </a:schemeClr>
-            </a:solidFill>
-            <a:ln w="19050">
+            <a:ln w="28575">
               <a:solidFill>
-                <a:schemeClr val="tx1"/>
+                <a:srgbClr val="FF0000"/>
               </a:solidFill>
             </a:ln>
           </p:spPr>
           <p:style>
-            <a:lnRef idx="2">
-              <a:schemeClr val="accent1">
-                <a:shade val="50000"/>
-              </a:schemeClr>
+            <a:lnRef idx="1">
+              <a:schemeClr val="accent1"/>
             </a:lnRef>
-            <a:fillRef idx="1">
+            <a:fillRef idx="0">
               <a:schemeClr val="accent1"/>
             </a:fillRef>
             <a:effectRef idx="0">
               <a:schemeClr val="accent1"/>
             </a:effectRef>
             <a:fontRef idx="minor">
-              <a:schemeClr val="lt1"/>
+              <a:schemeClr val="tx1"/>
             </a:fontRef>
           </p:style>
-          <p:txBody>
-            <a:bodyPr rtlCol="0" anchor="ctr"/>
-            <a:lstStyle/>
-            <a:p>
-              <a:pPr algn="ctr"/>
-              <a:r>
-                <a:rPr lang="en-US" altLang="zh-CN" sz="1600" dirty="0">
-                  <a:solidFill>
-                    <a:schemeClr val="tx1"/>
-                  </a:solidFill>
-                  <a:latin typeface="Times New Roman" pitchFamily="18" charset="0"/>
-                  <a:cs typeface="Times New Roman" pitchFamily="18" charset="0"/>
-                </a:rPr>
-                <a:t>(function)</a:t>
-              </a:r>
-              <a:endParaRPr lang="zh-CN" altLang="en-US" sz="1600" dirty="0">
-                <a:solidFill>
-                  <a:schemeClr val="tx1"/>
-                </a:solidFill>
-                <a:latin typeface="Times New Roman" pitchFamily="18" charset="0"/>
-                <a:cs typeface="Times New Roman" pitchFamily="18" charset="0"/>
-              </a:endParaRPr>
-            </a:p>
-          </p:txBody>
-        </p:sp>
-      </p:grpSp>
-      <p:cxnSp>
-        <p:nvCxnSpPr>
-          <p:cNvPr id="78" name="肘形连接符 77"/>
-          <p:cNvCxnSpPr>
-            <a:endCxn id="95" idx="0"/>
-          </p:cNvCxnSpPr>
-          <p:nvPr/>
-        </p:nvCxnSpPr>
-        <p:spPr>
-          <a:xfrm rot="10800000">
-            <a:off x="1907560" y="1052736"/>
-            <a:ext cx="4563176" cy="474712"/>
-          </a:xfrm>
-          <a:prstGeom prst="bentConnector4">
-            <a:avLst>
-              <a:gd name="adj1" fmla="val -26571"/>
-              <a:gd name="adj2" fmla="val 148156"/>
-            </a:avLst>
-          </a:prstGeom>
-          <a:ln w="19050">
-            <a:solidFill>
-              <a:schemeClr val="tx1"/>
-            </a:solidFill>
-            <a:headEnd type="oval" w="med" len="med"/>
-            <a:tailEnd type="triangle" w="lg" len="med"/>
-          </a:ln>
-        </p:spPr>
-        <p:style>
-          <a:lnRef idx="1">
-            <a:schemeClr val="accent1"/>
-          </a:lnRef>
-          <a:fillRef idx="0">
-            <a:schemeClr val="accent1"/>
-          </a:fillRef>
-          <a:effectRef idx="0">
-            <a:schemeClr val="accent1"/>
-          </a:effectRef>
-          <a:fontRef idx="minor">
-            <a:schemeClr val="tx1"/>
-          </a:fontRef>
-        </p:style>
-      </p:cxnSp>
-      <p:grpSp>
-        <p:nvGrpSpPr>
-          <p:cNvPr id="103" name="组合 102"/>
-          <p:cNvGrpSpPr/>
-          <p:nvPr/>
-        </p:nvGrpSpPr>
-        <p:grpSpPr>
-          <a:xfrm>
-            <a:off x="4072287" y="3212976"/>
-            <a:ext cx="2592000" cy="949660"/>
-            <a:chOff x="4071741" y="4135760"/>
-            <a:chExt cx="2592000" cy="949660"/>
-          </a:xfrm>
-        </p:grpSpPr>
-        <p:sp>
-          <p:nvSpPr>
-            <p:cNvPr id="104" name="矩形 103"/>
-            <p:cNvSpPr/>
+        </p:cxnSp>
+        <p:cxnSp>
+          <p:nvCxnSpPr>
+            <p:cNvPr id="112" name="肘形连接符 111"/>
+            <p:cNvCxnSpPr>
+              <a:endCxn id="99" idx="0"/>
+            </p:cNvCxnSpPr>
             <p:nvPr/>
-          </p:nvSpPr>
+          </p:nvCxnSpPr>
           <p:spPr>
-            <a:xfrm>
-              <a:off x="4071741" y="4135760"/>
-              <a:ext cx="2592000" cy="949660"/>
+            <a:xfrm rot="10800000" flipV="1">
+              <a:off x="1907562" y="3068960"/>
+              <a:ext cx="5040703" cy="1440160"/>
             </a:xfrm>
-            <a:prstGeom prst="rect">
+            <a:prstGeom prst="bentConnector2">
               <a:avLst/>
             </a:prstGeom>
-            <a:solidFill>
-              <a:schemeClr val="bg1">
-                <a:lumMod val="95000"/>
-              </a:schemeClr>
-            </a:solidFill>
             <a:ln w="19050">
               <a:solidFill>
                 <a:schemeClr val="tx1"/>
               </a:solidFill>
+              <a:headEnd type="none" w="med" len="med"/>
+              <a:tailEnd type="triangle" w="lg" len="med"/>
             </a:ln>
           </p:spPr>
           <p:style>
-            <a:lnRef idx="2">
-              <a:schemeClr val="accent1">
-                <a:shade val="50000"/>
-              </a:schemeClr>
+            <a:lnRef idx="1">
+              <a:schemeClr val="accent1"/>
             </a:lnRef>
-            <a:fillRef idx="1">
+            <a:fillRef idx="0">
               <a:schemeClr val="accent1"/>
             </a:fillRef>
             <a:effectRef idx="0">
               <a:schemeClr val="accent1"/>
             </a:effectRef>
             <a:fontRef idx="minor">
-              <a:schemeClr val="lt1"/>
+              <a:schemeClr val="tx1"/>
             </a:fontRef>
           </p:style>
-          <p:txBody>
-            <a:bodyPr rtlCol="0" anchor="ctr"/>
-            <a:lstStyle/>
-            <a:p>
-              <a:pPr algn="ctr"/>
-              <a:endParaRPr lang="zh-CN" altLang="en-US">
-                <a:latin typeface="Times New Roman" pitchFamily="18" charset="0"/>
-                <a:cs typeface="Times New Roman" pitchFamily="18" charset="0"/>
-              </a:endParaRPr>
-            </a:p>
-          </p:txBody>
-        </p:sp>
-        <p:sp>
-          <p:nvSpPr>
-            <p:cNvPr id="105" name="矩形 104"/>
-            <p:cNvSpPr/>
+        </p:cxnSp>
+        <p:cxnSp>
+          <p:nvCxnSpPr>
+            <p:cNvPr id="128" name="肘形连接符 127"/>
+            <p:cNvCxnSpPr>
+              <a:endCxn id="105" idx="1"/>
+            </p:cNvCxnSpPr>
             <p:nvPr/>
-          </p:nvSpPr>
+          </p:nvCxnSpPr>
           <p:spPr>
-            <a:xfrm>
-              <a:off x="4071741" y="4135760"/>
-              <a:ext cx="2592000" cy="315772"/>
+            <a:xfrm rot="5400000" flipH="1" flipV="1">
+              <a:off x="2468897" y="4609874"/>
+              <a:ext cx="2842402" cy="364378"/>
             </a:xfrm>
-            <a:prstGeom prst="rect">
+            <a:prstGeom prst="bentConnector2">
               <a:avLst/>
             </a:prstGeom>
-            <a:solidFill>
-              <a:schemeClr val="accent5">
-                <a:lumMod val="40000"/>
-                <a:lumOff val="60000"/>
-              </a:schemeClr>
-            </a:solidFill>
-            <a:ln w="19050">
+            <a:ln w="28575">
               <a:solidFill>
-                <a:schemeClr val="tx1"/>
+                <a:srgbClr val="FF0000"/>
               </a:solidFill>
+              <a:prstDash val="solid"/>
+              <a:headEnd type="none" w="med" len="med"/>
+              <a:tailEnd type="triangle" w="lg" len="med"/>
             </a:ln>
           </p:spPr>
           <p:style>
-            <a:lnRef idx="2">
-              <a:schemeClr val="accent1">
-                <a:shade val="50000"/>
-              </a:schemeClr>
+            <a:lnRef idx="1">
+              <a:schemeClr val="accent1"/>
             </a:lnRef>
-            <a:fillRef idx="1">
+            <a:fillRef idx="0">
               <a:schemeClr val="accent1"/>
             </a:fillRef>
             <a:effectRef idx="0">
               <a:schemeClr val="accent1"/>
             </a:effectRef>
             <a:fontRef idx="minor">
-              <a:schemeClr val="lt1"/>
+              <a:schemeClr val="tx1"/>
             </a:fontRef>
           </p:style>
-          <p:txBody>
-            <a:bodyPr rtlCol="0" anchor="ctr"/>
-            <a:lstStyle/>
-            <a:p>
-              <a:pPr algn="ctr"/>
-              <a:r>
-                <a:rPr lang="zh-CN" altLang="en-US" dirty="0" smtClean="0">
-                  <a:solidFill>
-                    <a:schemeClr val="tx1"/>
-                  </a:solidFill>
-                  <a:latin typeface="Times New Roman" pitchFamily="18" charset="0"/>
-                  <a:cs typeface="Times New Roman" pitchFamily="18" charset="0"/>
-                </a:rPr>
-                <a:t>默认的</a:t>
-              </a:r>
-              <a:r>
-                <a:rPr lang="en-US" altLang="zh-CN" dirty="0" smtClean="0">
-                  <a:solidFill>
-                    <a:schemeClr val="tx1"/>
-                  </a:solidFill>
-                  <a:latin typeface="Times New Roman" pitchFamily="18" charset="0"/>
-                  <a:cs typeface="Times New Roman" pitchFamily="18" charset="0"/>
-                </a:rPr>
-                <a:t>Person Prototype</a:t>
-              </a:r>
-              <a:endParaRPr lang="zh-CN" altLang="en-US" dirty="0">
-                <a:solidFill>
-                  <a:schemeClr val="tx1"/>
-                </a:solidFill>
-                <a:latin typeface="Times New Roman" pitchFamily="18" charset="0"/>
-                <a:cs typeface="Times New Roman" pitchFamily="18" charset="0"/>
-              </a:endParaRPr>
-            </a:p>
-          </p:txBody>
-        </p:sp>
-        <p:sp>
-          <p:nvSpPr>
-            <p:cNvPr id="106" name="矩形 105"/>
-            <p:cNvSpPr/>
+        </p:cxnSp>
+        <p:cxnSp>
+          <p:nvCxnSpPr>
+            <p:cNvPr id="109" name="肘形连接符 108"/>
+            <p:cNvCxnSpPr/>
             <p:nvPr/>
-          </p:nvSpPr>
+          </p:nvCxnSpPr>
           <p:spPr>
-            <a:xfrm>
-              <a:off x="4071741" y="4451531"/>
-              <a:ext cx="1296000" cy="310827"/>
+            <a:xfrm flipV="1">
+              <a:off x="5993209" y="3068960"/>
+              <a:ext cx="955055" cy="639104"/>
             </a:xfrm>
-            <a:prstGeom prst="rect">
-              <a:avLst/>
+            <a:prstGeom prst="bentConnector3">
+              <a:avLst>
+                <a:gd name="adj1" fmla="val 111036"/>
+              </a:avLst>
             </a:prstGeom>
-            <a:solidFill>
-              <a:schemeClr val="bg1">
-                <a:lumMod val="95000"/>
-              </a:schemeClr>
-            </a:solidFill>
             <a:ln w="19050">
               <a:solidFill>
                 <a:schemeClr val="tx1"/>
               </a:solidFill>
+              <a:prstDash val="solid"/>
+              <a:headEnd type="oval" w="med" len="med"/>
+              <a:tailEnd type="none" w="med" len="med"/>
             </a:ln>
           </p:spPr>
           <p:style>
-            <a:lnRef idx="2">
-              <a:schemeClr val="accent1">
-                <a:shade val="50000"/>
-              </a:schemeClr>
+            <a:lnRef idx="1">
+              <a:schemeClr val="accent1"/>
             </a:lnRef>
-            <a:fillRef idx="1">
+            <a:fillRef idx="0">
               <a:schemeClr val="accent1"/>
             </a:fillRef>
             <a:effectRef idx="0">
               <a:schemeClr val="accent1"/>
             </a:effectRef>
             <a:fontRef idx="minor">
-              <a:schemeClr val="lt1"/>
+              <a:schemeClr val="tx1"/>
             </a:fontRef>
           </p:style>
-          <p:txBody>
-            <a:bodyPr rtlCol="0" anchor="ctr"/>
-            <a:lstStyle/>
-            <a:p>
-              <a:pPr algn="ctr"/>
-              <a:r>
-                <a:rPr lang="en-US" altLang="zh-CN" sz="1600" dirty="0" smtClean="0">
-                  <a:solidFill>
-                    <a:schemeClr val="tx1"/>
-                  </a:solidFill>
-                  <a:latin typeface="Times New Roman" pitchFamily="18" charset="0"/>
-                  <a:cs typeface="Times New Roman" pitchFamily="18" charset="0"/>
-                </a:rPr>
-                <a:t>constructor</a:t>
-              </a:r>
-              <a:endParaRPr lang="zh-CN" altLang="en-US" sz="1600" dirty="0">
-                <a:solidFill>
-                  <a:schemeClr val="tx1"/>
-                </a:solidFill>
-                <a:latin typeface="Times New Roman" pitchFamily="18" charset="0"/>
-                <a:cs typeface="Times New Roman" pitchFamily="18" charset="0"/>
-              </a:endParaRPr>
-            </a:p>
-          </p:txBody>
-        </p:sp>
-        <p:sp>
-          <p:nvSpPr>
-            <p:cNvPr id="107" name="矩形 106"/>
-            <p:cNvSpPr/>
+        </p:cxnSp>
+        <p:cxnSp>
+          <p:nvCxnSpPr>
+            <p:cNvPr id="71" name="肘形连接符 70"/>
+            <p:cNvCxnSpPr/>
             <p:nvPr/>
-          </p:nvSpPr>
+          </p:nvCxnSpPr>
           <p:spPr>
-            <a:xfrm>
-              <a:off x="4071741" y="4762710"/>
-              <a:ext cx="1296000" cy="315772"/>
+            <a:xfrm flipV="1">
+              <a:off x="6016288" y="3997813"/>
+              <a:ext cx="1454935" cy="989038"/>
             </a:xfrm>
-            <a:prstGeom prst="rect">
-              <a:avLst/>
+            <a:prstGeom prst="bentConnector3">
+              <a:avLst>
+                <a:gd name="adj1" fmla="val 99755"/>
+              </a:avLst>
             </a:prstGeom>
-            <a:solidFill>
-              <a:schemeClr val="bg1">
-                <a:lumMod val="95000"/>
-              </a:schemeClr>
-            </a:solidFill>
-            <a:ln w="19050">
+            <a:ln w="28575">
               <a:solidFill>
-                <a:schemeClr val="tx1"/>
+                <a:srgbClr val="FF0000"/>
               </a:solidFill>
+              <a:prstDash val="solid"/>
+              <a:headEnd type="oval" w="med" len="med"/>
+              <a:tailEnd type="none" w="med" len="med"/>
             </a:ln>
           </p:spPr>
           <p:style>
-            <a:lnRef idx="2">
-              <a:schemeClr val="accent1">
-                <a:shade val="50000"/>
-              </a:schemeClr>
+            <a:lnRef idx="1">
+              <a:schemeClr val="accent1"/>
             </a:lnRef>
-            <a:fillRef idx="1">
+            <a:fillRef idx="0">
               <a:schemeClr val="accent1"/>
             </a:fillRef>
             <a:effectRef idx="0">
               <a:schemeClr val="accent1"/>
             </a:effectRef>
             <a:fontRef idx="minor">
-              <a:schemeClr val="lt1"/>
+              <a:schemeClr val="tx1"/>
             </a:fontRef>
           </p:style>
-          <p:txBody>
-            <a:bodyPr rtlCol="0" anchor="ctr"/>
-            <a:lstStyle/>
-            <a:p>
-              <a:pPr algn="ctr"/>
-              <a:r>
-                <a:rPr lang="en-US" altLang="zh-CN" sz="1600" dirty="0" smtClean="0">
-                  <a:solidFill>
-                    <a:schemeClr val="tx1"/>
-                  </a:solidFill>
-                  <a:latin typeface="Times New Roman" pitchFamily="18" charset="0"/>
-                  <a:cs typeface="Times New Roman" pitchFamily="18" charset="0"/>
-                </a:rPr>
-                <a:t>[[prototype]]</a:t>
-              </a:r>
-              <a:endParaRPr lang="zh-CN" altLang="en-US" sz="1600" dirty="0">
-                <a:solidFill>
-                  <a:schemeClr val="tx1"/>
-                </a:solidFill>
-                <a:latin typeface="Times New Roman" pitchFamily="18" charset="0"/>
-                <a:cs typeface="Times New Roman" pitchFamily="18" charset="0"/>
-              </a:endParaRPr>
-            </a:p>
-          </p:txBody>
-        </p:sp>
-        <p:sp>
-          <p:nvSpPr>
-            <p:cNvPr id="108" name="矩形 107"/>
-            <p:cNvSpPr/>
+        </p:cxnSp>
+        <p:cxnSp>
+          <p:nvCxnSpPr>
+            <p:cNvPr id="27" name="直接连接符 26"/>
+            <p:cNvCxnSpPr/>
             <p:nvPr/>
-          </p:nvSpPr>
+          </p:nvCxnSpPr>
           <p:spPr>
-            <a:xfrm>
-              <a:off x="5367741" y="4762359"/>
-              <a:ext cx="1296000" cy="315772"/>
+            <a:xfrm flipH="1">
+              <a:off x="2555776" y="6206914"/>
+              <a:ext cx="1152348" cy="0"/>
             </a:xfrm>
-            <a:prstGeom prst="rect">
+            <a:prstGeom prst="line">
               <a:avLst/>
             </a:prstGeom>
-            <a:solidFill>
-              <a:schemeClr val="bg1">
-                <a:lumMod val="95000"/>
-              </a:schemeClr>
-            </a:solidFill>
-            <a:ln w="19050">
+            <a:ln w="28575">
               <a:solidFill>
-                <a:schemeClr val="tx1"/>
+                <a:srgbClr val="FF0000"/>
               </a:solidFill>
+              <a:headEnd type="none" w="lg" len="med"/>
+              <a:tailEnd type="oval"/>
             </a:ln>
           </p:spPr>
           <p:style>
-            <a:lnRef idx="2">
-              <a:schemeClr val="accent1">
-                <a:shade val="50000"/>
-              </a:schemeClr>
+            <a:lnRef idx="1">
+              <a:schemeClr val="accent1"/>
             </a:lnRef>
-            <a:fillRef idx="1">
+            <a:fillRef idx="0">
               <a:schemeClr val="accent1"/>
             </a:fillRef>
             <a:effectRef idx="0">
               <a:schemeClr val="accent1"/>
             </a:effectRef>
             <a:fontRef idx="minor">
-              <a:schemeClr val="lt1"/>
+              <a:schemeClr val="tx1"/>
             </a:fontRef>
           </p:style>
-          <p:txBody>
-            <a:bodyPr rtlCol="0" anchor="ctr"/>
-            <a:lstStyle/>
-            <a:p>
-              <a:pPr algn="ctr"/>
-              <a:endParaRPr lang="zh-CN" altLang="en-US" sz="1600" dirty="0">
-                <a:solidFill>
-                  <a:schemeClr val="tx1"/>
-                </a:solidFill>
-                <a:latin typeface="Times New Roman" pitchFamily="18" charset="0"/>
-                <a:cs typeface="Times New Roman" pitchFamily="18" charset="0"/>
-              </a:endParaRPr>
-            </a:p>
-          </p:txBody>
-        </p:sp>
+        </p:cxnSp>
       </p:grpSp>
-      <p:cxnSp>
-        <p:nvCxnSpPr>
-          <p:cNvPr id="62" name="肘形连接符 61"/>
-          <p:cNvCxnSpPr>
-            <a:endCxn id="96" idx="0"/>
-          </p:cNvCxnSpPr>
-          <p:nvPr/>
-        </p:nvCxnSpPr>
-        <p:spPr>
-          <a:xfrm rot="10800000">
-            <a:off x="1907560" y="1052736"/>
-            <a:ext cx="4108728" cy="3927568"/>
-          </a:xfrm>
-          <a:prstGeom prst="bentConnector4">
-            <a:avLst>
-              <a:gd name="adj1" fmla="val -53122"/>
-              <a:gd name="adj2" fmla="val 105820"/>
-            </a:avLst>
-          </a:prstGeom>
-          <a:ln w="19050">
-            <a:solidFill>
-              <a:schemeClr val="tx1"/>
-            </a:solidFill>
-            <a:headEnd type="oval" w="med" len="med"/>
-            <a:tailEnd type="triangle" w="lg" len="med"/>
-          </a:ln>
-        </p:spPr>
-        <p:style>
-          <a:lnRef idx="1">
-            <a:schemeClr val="accent1"/>
-          </a:lnRef>
-          <a:fillRef idx="0">
-            <a:schemeClr val="accent1"/>
-          </a:fillRef>
-          <a:effectRef idx="0">
-            <a:schemeClr val="accent1"/>
-          </a:effectRef>
-          <a:fontRef idx="minor">
-            <a:schemeClr val="tx1"/>
-          </a:fontRef>
-        </p:style>
-      </p:cxnSp>
-      <p:cxnSp>
-        <p:nvCxnSpPr>
-          <p:cNvPr id="68" name="肘形连接符 67"/>
-          <p:cNvCxnSpPr/>
-          <p:nvPr/>
-        </p:nvCxnSpPr>
-        <p:spPr>
-          <a:xfrm flipV="1">
-            <a:off x="6015740" y="2924945"/>
-            <a:ext cx="1455483" cy="1072516"/>
-          </a:xfrm>
-          <a:prstGeom prst="bentConnector3">
-            <a:avLst>
-              <a:gd name="adj1" fmla="val 99474"/>
-            </a:avLst>
-          </a:prstGeom>
-          <a:ln w="28575">
-            <a:solidFill>
-              <a:srgbClr val="FF0000"/>
-            </a:solidFill>
-            <a:prstDash val="solid"/>
-            <a:headEnd type="oval" w="med" len="med"/>
-            <a:tailEnd type="none" w="med" len="med"/>
-          </a:ln>
-        </p:spPr>
-        <p:style>
-          <a:lnRef idx="1">
-            <a:schemeClr val="accent1"/>
-          </a:lnRef>
-          <a:fillRef idx="0">
-            <a:schemeClr val="accent1"/>
-          </a:fillRef>
-          <a:effectRef idx="0">
-            <a:schemeClr val="accent1"/>
-          </a:effectRef>
-          <a:fontRef idx="minor">
-            <a:schemeClr val="tx1"/>
-          </a:fontRef>
-        </p:style>
-      </p:cxnSp>
-      <p:cxnSp>
-        <p:nvCxnSpPr>
-          <p:cNvPr id="11" name="直接连接符 10"/>
-          <p:cNvCxnSpPr/>
-          <p:nvPr/>
-        </p:nvCxnSpPr>
-        <p:spPr>
-          <a:xfrm>
-            <a:off x="3555216" y="2924944"/>
-            <a:ext cx="3916004" cy="0"/>
-          </a:xfrm>
-          <a:prstGeom prst="line">
-            <a:avLst/>
-          </a:prstGeom>
-          <a:ln w="28575">
-            <a:solidFill>
-              <a:srgbClr val="FF0000"/>
-            </a:solidFill>
-          </a:ln>
-        </p:spPr>
-        <p:style>
-          <a:lnRef idx="1">
-            <a:schemeClr val="accent1"/>
-          </a:lnRef>
-          <a:fillRef idx="0">
-            <a:schemeClr val="accent1"/>
-          </a:fillRef>
-          <a:effectRef idx="0">
-            <a:schemeClr val="accent1"/>
-          </a:effectRef>
-          <a:fontRef idx="minor">
-            <a:schemeClr val="tx1"/>
-          </a:fontRef>
-        </p:style>
-      </p:cxnSp>
-      <p:cxnSp>
-        <p:nvCxnSpPr>
-          <p:cNvPr id="112" name="肘形连接符 111"/>
-          <p:cNvCxnSpPr>
-            <a:endCxn id="99" idx="0"/>
-          </p:cNvCxnSpPr>
-          <p:nvPr/>
-        </p:nvCxnSpPr>
-        <p:spPr>
-          <a:xfrm rot="10800000" flipV="1">
-            <a:off x="1907562" y="3068960"/>
-            <a:ext cx="5040703" cy="1440160"/>
-          </a:xfrm>
-          <a:prstGeom prst="bentConnector2">
-            <a:avLst/>
-          </a:prstGeom>
-          <a:ln w="19050">
-            <a:solidFill>
-              <a:schemeClr val="tx1"/>
-            </a:solidFill>
-            <a:headEnd type="none" w="med" len="med"/>
-            <a:tailEnd type="triangle" w="lg" len="med"/>
-          </a:ln>
-        </p:spPr>
-        <p:style>
-          <a:lnRef idx="1">
-            <a:schemeClr val="accent1"/>
-          </a:lnRef>
-          <a:fillRef idx="0">
-            <a:schemeClr val="accent1"/>
-          </a:fillRef>
-          <a:effectRef idx="0">
-            <a:schemeClr val="accent1"/>
-          </a:effectRef>
-          <a:fontRef idx="minor">
-            <a:schemeClr val="tx1"/>
-          </a:fontRef>
-        </p:style>
-      </p:cxnSp>
-      <p:cxnSp>
-        <p:nvCxnSpPr>
-          <p:cNvPr id="128" name="肘形连接符 127"/>
-          <p:cNvCxnSpPr>
-            <a:endCxn id="105" idx="1"/>
-          </p:cNvCxnSpPr>
-          <p:nvPr/>
-        </p:nvCxnSpPr>
-        <p:spPr>
-          <a:xfrm rot="5400000" flipH="1" flipV="1">
-            <a:off x="2468897" y="4609874"/>
-            <a:ext cx="2842402" cy="364378"/>
-          </a:xfrm>
-          <a:prstGeom prst="bentConnector2">
-            <a:avLst/>
-          </a:prstGeom>
-          <a:ln w="28575">
-            <a:solidFill>
-              <a:srgbClr val="FF0000"/>
-            </a:solidFill>
-            <a:prstDash val="solid"/>
-            <a:headEnd type="none" w="med" len="med"/>
-            <a:tailEnd type="triangle" w="lg" len="med"/>
-          </a:ln>
-        </p:spPr>
-        <p:style>
-          <a:lnRef idx="1">
-            <a:schemeClr val="accent1"/>
-          </a:lnRef>
-          <a:fillRef idx="0">
-            <a:schemeClr val="accent1"/>
-          </a:fillRef>
-          <a:effectRef idx="0">
-            <a:schemeClr val="accent1"/>
-          </a:effectRef>
-          <a:fontRef idx="minor">
-            <a:schemeClr val="tx1"/>
-          </a:fontRef>
-        </p:style>
-      </p:cxnSp>
-      <p:cxnSp>
-        <p:nvCxnSpPr>
-          <p:cNvPr id="109" name="肘形连接符 108"/>
-          <p:cNvCxnSpPr/>
-          <p:nvPr/>
-        </p:nvCxnSpPr>
-        <p:spPr>
-          <a:xfrm flipV="1">
-            <a:off x="5993209" y="3068960"/>
-            <a:ext cx="955055" cy="639104"/>
-          </a:xfrm>
-          <a:prstGeom prst="bentConnector3">
-            <a:avLst>
-              <a:gd name="adj1" fmla="val 111036"/>
-            </a:avLst>
-          </a:prstGeom>
-          <a:ln w="19050">
-            <a:solidFill>
-              <a:schemeClr val="tx1"/>
-            </a:solidFill>
-            <a:prstDash val="solid"/>
-            <a:headEnd type="oval" w="med" len="med"/>
-            <a:tailEnd type="none" w="med" len="med"/>
-          </a:ln>
-        </p:spPr>
-        <p:style>
-          <a:lnRef idx="1">
-            <a:schemeClr val="accent1"/>
-          </a:lnRef>
-          <a:fillRef idx="0">
-            <a:schemeClr val="accent1"/>
-          </a:fillRef>
-          <a:effectRef idx="0">
-            <a:schemeClr val="accent1"/>
-          </a:effectRef>
-          <a:fontRef idx="minor">
-            <a:schemeClr val="tx1"/>
-          </a:fontRef>
-        </p:style>
-      </p:cxnSp>
-      <p:cxnSp>
-        <p:nvCxnSpPr>
-          <p:cNvPr id="71" name="肘形连接符 70"/>
-          <p:cNvCxnSpPr/>
-          <p:nvPr/>
-        </p:nvCxnSpPr>
-        <p:spPr>
-          <a:xfrm flipV="1">
-            <a:off x="6016288" y="3997812"/>
-            <a:ext cx="1454935" cy="1306509"/>
-          </a:xfrm>
-          <a:prstGeom prst="bentConnector3">
-            <a:avLst>
-              <a:gd name="adj1" fmla="val 99755"/>
-            </a:avLst>
-          </a:prstGeom>
-          <a:ln w="28575">
-            <a:solidFill>
-              <a:srgbClr val="FF0000"/>
-            </a:solidFill>
-            <a:prstDash val="solid"/>
-            <a:headEnd type="oval" w="med" len="med"/>
-            <a:tailEnd type="none" w="med" len="med"/>
-          </a:ln>
-        </p:spPr>
-        <p:style>
-          <a:lnRef idx="1">
-            <a:schemeClr val="accent1"/>
-          </a:lnRef>
-          <a:fillRef idx="0">
-            <a:schemeClr val="accent1"/>
-          </a:fillRef>
-          <a:effectRef idx="0">
-            <a:schemeClr val="accent1"/>
-          </a:effectRef>
-          <a:fontRef idx="minor">
-            <a:schemeClr val="tx1"/>
-          </a:fontRef>
-        </p:style>
-      </p:cxnSp>
-      <p:cxnSp>
-        <p:nvCxnSpPr>
-          <p:cNvPr id="27" name="直接连接符 26"/>
-          <p:cNvCxnSpPr/>
-          <p:nvPr/>
-        </p:nvCxnSpPr>
-        <p:spPr>
-          <a:xfrm flipH="1">
-            <a:off x="2555776" y="6206914"/>
-            <a:ext cx="1152348" cy="0"/>
-          </a:xfrm>
-          <a:prstGeom prst="line">
-            <a:avLst/>
-          </a:prstGeom>
-          <a:ln w="28575">
-            <a:solidFill>
-              <a:srgbClr val="FF0000"/>
-            </a:solidFill>
-            <a:headEnd type="none" w="lg" len="med"/>
-            <a:tailEnd type="oval"/>
-          </a:ln>
-        </p:spPr>
-        <p:style>
-          <a:lnRef idx="1">
-            <a:schemeClr val="accent1"/>
-          </a:lnRef>
-          <a:fillRef idx="0">
-            <a:schemeClr val="accent1"/>
-          </a:fillRef>
-          <a:effectRef idx="0">
-            <a:schemeClr val="accent1"/>
-          </a:effectRef>
-          <a:fontRef idx="minor">
-            <a:schemeClr val="tx1"/>
-          </a:fontRef>
-        </p:style>
-      </p:cxnSp>
     </p:spTree>
     <p:extLst>
       <p:ext uri="{BB962C8B-B14F-4D97-AF65-F5344CB8AC3E}">
@@ -22832,17 +22739,7 @@
                       <a:latin typeface="Times New Roman" pitchFamily="18" charset="0"/>
                       <a:cs typeface="Times New Roman" pitchFamily="18" charset="0"/>
                     </a:rPr>
-                    <a:t>B </a:t>
-                  </a:r>
-                  <a:r>
-                    <a:rPr lang="en-US" altLang="zh-CN" dirty="0" smtClean="0">
-                      <a:solidFill>
-                        <a:schemeClr val="tx1"/>
-                      </a:solidFill>
-                      <a:latin typeface="Times New Roman" pitchFamily="18" charset="0"/>
-                      <a:cs typeface="Times New Roman" pitchFamily="18" charset="0"/>
-                    </a:rPr>
-                    <a:t>Prototype</a:t>
+                    <a:t>B Prototype</a:t>
                   </a:r>
                   <a:endParaRPr lang="zh-CN" altLang="en-US" dirty="0">
                     <a:solidFill>

</xml_diff>